<commit_message>
corrected role reversal instructions #9 and update tweets.
</commit_message>
<xml_diff>
--- a/public/js/tasks/blind_dating/media/Blind_dating_game_instructions.pptx
+++ b/public/js/tasks/blind_dating/media/Blind_dating_game_instructions.pptx
@@ -229,7 +229,7 @@
           <a:p>
             <a:fld id="{5ACDFB13-8C7E-2148-B293-047F9641DD71}" type="datetimeFigureOut">
               <a:rPr lang="en-US" smtClean="0"/>
-              <a:t>7/11/22</a:t>
+              <a:t>7/27/22</a:t>
             </a:fld>
             <a:endParaRPr lang="en-US" dirty="0"/>
           </a:p>
@@ -3077,7 +3077,7 @@
           <a:p>
             <a:fld id="{E69A4D3A-6EF8-7448-AC6F-AD52FEDAA6A8}" type="datetimeFigureOut">
               <a:rPr lang="en-US" smtClean="0"/>
-              <a:t>7/11/22</a:t>
+              <a:t>7/27/22</a:t>
             </a:fld>
             <a:endParaRPr lang="en-US" dirty="0"/>
           </a:p>
@@ -3245,7 +3245,7 @@
           <a:p>
             <a:fld id="{E69A4D3A-6EF8-7448-AC6F-AD52FEDAA6A8}" type="datetimeFigureOut">
               <a:rPr lang="en-US" smtClean="0"/>
-              <a:t>7/11/22</a:t>
+              <a:t>7/27/22</a:t>
             </a:fld>
             <a:endParaRPr lang="en-US" dirty="0"/>
           </a:p>
@@ -3423,7 +3423,7 @@
           <a:p>
             <a:fld id="{E69A4D3A-6EF8-7448-AC6F-AD52FEDAA6A8}" type="datetimeFigureOut">
               <a:rPr lang="en-US" smtClean="0"/>
-              <a:t>7/11/22</a:t>
+              <a:t>7/27/22</a:t>
             </a:fld>
             <a:endParaRPr lang="en-US" dirty="0"/>
           </a:p>
@@ -3591,7 +3591,7 @@
           <a:p>
             <a:fld id="{E69A4D3A-6EF8-7448-AC6F-AD52FEDAA6A8}" type="datetimeFigureOut">
               <a:rPr lang="en-US" smtClean="0"/>
-              <a:t>7/11/22</a:t>
+              <a:t>7/27/22</a:t>
             </a:fld>
             <a:endParaRPr lang="en-US" dirty="0"/>
           </a:p>
@@ -3836,7 +3836,7 @@
           <a:p>
             <a:fld id="{E69A4D3A-6EF8-7448-AC6F-AD52FEDAA6A8}" type="datetimeFigureOut">
               <a:rPr lang="en-US" smtClean="0"/>
-              <a:t>7/11/22</a:t>
+              <a:t>7/27/22</a:t>
             </a:fld>
             <a:endParaRPr lang="en-US" dirty="0"/>
           </a:p>
@@ -4121,7 +4121,7 @@
           <a:p>
             <a:fld id="{E69A4D3A-6EF8-7448-AC6F-AD52FEDAA6A8}" type="datetimeFigureOut">
               <a:rPr lang="en-US" smtClean="0"/>
-              <a:t>7/11/22</a:t>
+              <a:t>7/27/22</a:t>
             </a:fld>
             <a:endParaRPr lang="en-US" dirty="0"/>
           </a:p>
@@ -4540,7 +4540,7 @@
           <a:p>
             <a:fld id="{E69A4D3A-6EF8-7448-AC6F-AD52FEDAA6A8}" type="datetimeFigureOut">
               <a:rPr lang="en-US" smtClean="0"/>
-              <a:t>7/11/22</a:t>
+              <a:t>7/27/22</a:t>
             </a:fld>
             <a:endParaRPr lang="en-US" dirty="0"/>
           </a:p>
@@ -4657,7 +4657,7 @@
           <a:p>
             <a:fld id="{E69A4D3A-6EF8-7448-AC6F-AD52FEDAA6A8}" type="datetimeFigureOut">
               <a:rPr lang="en-US" smtClean="0"/>
-              <a:t>7/11/22</a:t>
+              <a:t>7/27/22</a:t>
             </a:fld>
             <a:endParaRPr lang="en-US" dirty="0"/>
           </a:p>
@@ -4752,7 +4752,7 @@
           <a:p>
             <a:fld id="{E69A4D3A-6EF8-7448-AC6F-AD52FEDAA6A8}" type="datetimeFigureOut">
               <a:rPr lang="en-US" smtClean="0"/>
-              <a:t>7/11/22</a:t>
+              <a:t>7/27/22</a:t>
             </a:fld>
             <a:endParaRPr lang="en-US" dirty="0"/>
           </a:p>
@@ -5027,7 +5027,7 @@
           <a:p>
             <a:fld id="{E69A4D3A-6EF8-7448-AC6F-AD52FEDAA6A8}" type="datetimeFigureOut">
               <a:rPr lang="en-US" smtClean="0"/>
-              <a:t>7/11/22</a:t>
+              <a:t>7/27/22</a:t>
             </a:fld>
             <a:endParaRPr lang="en-US" dirty="0"/>
           </a:p>
@@ -5282,7 +5282,7 @@
           <a:p>
             <a:fld id="{E69A4D3A-6EF8-7448-AC6F-AD52FEDAA6A8}" type="datetimeFigureOut">
               <a:rPr lang="en-US" smtClean="0"/>
-              <a:t>7/11/22</a:t>
+              <a:t>7/27/22</a:t>
             </a:fld>
             <a:endParaRPr lang="en-US" dirty="0"/>
           </a:p>
@@ -5496,7 +5496,7 @@
           <a:p>
             <a:fld id="{E69A4D3A-6EF8-7448-AC6F-AD52FEDAA6A8}" type="datetimeFigureOut">
               <a:rPr lang="en-US" smtClean="0"/>
-              <a:t>7/11/22</a:t>
+              <a:t>7/27/22</a:t>
             </a:fld>
             <a:endParaRPr lang="en-US" dirty="0"/>
           </a:p>
@@ -6378,87 +6378,6 @@
       </p:sp>
       <p:sp>
         <p:nvSpPr>
-          <p:cNvPr id="16" name="Rectangle 15">
-            <a:extLst>
-              <a:ext uri="{FF2B5EF4-FFF2-40B4-BE49-F238E27FC236}">
-                <a16:creationId xmlns:a16="http://schemas.microsoft.com/office/drawing/2014/main" id="{3BA95B9C-908A-3942-9905-DA59738A2007}"/>
-              </a:ext>
-            </a:extLst>
-          </p:cNvPr>
-          <p:cNvSpPr/>
-          <p:nvPr/>
-        </p:nvSpPr>
-        <p:spPr>
-          <a:xfrm>
-            <a:off x="7672815" y="3649269"/>
-            <a:ext cx="351046" cy="276498"/>
-          </a:xfrm>
-          <a:prstGeom prst="rect">
-            <a:avLst/>
-          </a:prstGeom>
-          <a:solidFill>
-            <a:schemeClr val="bg1"/>
-          </a:solidFill>
-          <a:ln>
-            <a:noFill/>
-          </a:ln>
-        </p:spPr>
-        <p:style>
-          <a:lnRef idx="2">
-            <a:schemeClr val="accent1">
-              <a:shade val="50000"/>
-            </a:schemeClr>
-          </a:lnRef>
-          <a:fillRef idx="1">
-            <a:schemeClr val="accent1"/>
-          </a:fillRef>
-          <a:effectRef idx="0">
-            <a:schemeClr val="accent1"/>
-          </a:effectRef>
-          <a:fontRef idx="minor">
-            <a:schemeClr val="lt1"/>
-          </a:fontRef>
-        </p:style>
-        <p:txBody>
-          <a:bodyPr rtlCol="0" anchor="ctr"/>
-          <a:lstStyle/>
-          <a:p>
-            <a:pPr marL="0" marR="0" lvl="0" indent="0" algn="ctr" defTabSz="457200" rtl="0" eaLnBrk="1" fontAlgn="auto" latinLnBrk="0" hangingPunct="1">
-              <a:lnSpc>
-                <a:spcPct val="100000"/>
-              </a:lnSpc>
-              <a:spcBef>
-                <a:spcPts val="0"/>
-              </a:spcBef>
-              <a:spcAft>
-                <a:spcPts val="0"/>
-              </a:spcAft>
-              <a:buClrTx/>
-              <a:buSzTx/>
-              <a:buFontTx/>
-              <a:buNone/>
-              <a:tabLst/>
-              <a:defRPr/>
-            </a:pPr>
-            <a:endParaRPr kumimoji="0" lang="en-US" sz="1800" b="0" i="0" u="none" strike="noStrike" kern="1200" cap="none" spc="0" normalizeH="0" baseline="0" noProof="0">
-              <a:ln>
-                <a:noFill/>
-              </a:ln>
-              <a:solidFill>
-                <a:prstClr val="white"/>
-              </a:solidFill>
-              <a:effectLst/>
-              <a:uLnTx/>
-              <a:uFillTx/>
-              <a:latin typeface="Calibri"/>
-              <a:ea typeface="+mn-ea"/>
-              <a:cs typeface="+mn-cs"/>
-            </a:endParaRPr>
-          </a:p>
-        </p:txBody>
-      </p:sp>
-      <p:sp>
-        <p:nvSpPr>
           <p:cNvPr id="14" name="Title 3">
             <a:extLst>
               <a:ext uri="{FF2B5EF4-FFF2-40B4-BE49-F238E27FC236}">
@@ -7042,64 +6961,6 @@
           </p:txBody>
         </p:sp>
       </p:grpSp>
-      <p:pic>
-        <p:nvPicPr>
-          <p:cNvPr id="23" name="Picture 22" descr="Graphical user interface, application&#10;&#10;Description automatically generated">
-            <a:extLst>
-              <a:ext uri="{FF2B5EF4-FFF2-40B4-BE49-F238E27FC236}">
-                <a16:creationId xmlns:a16="http://schemas.microsoft.com/office/drawing/2014/main" id="{E989441B-4597-AD47-A0CB-AAAF1D1BC639}"/>
-              </a:ext>
-            </a:extLst>
-          </p:cNvPr>
-          <p:cNvPicPr>
-            <a:picLocks noChangeAspect="1"/>
-          </p:cNvPicPr>
-          <p:nvPr/>
-        </p:nvPicPr>
-        <p:blipFill rotWithShape="1">
-          <a:blip r:embed="rId3"/>
-          <a:srcRect l="15336" t="5490" r="20662" b="55830"/>
-          <a:stretch/>
-        </p:blipFill>
-        <p:spPr>
-          <a:xfrm>
-            <a:off x="3546437" y="2346659"/>
-            <a:ext cx="5099126" cy="1836678"/>
-          </a:xfrm>
-          <a:prstGeom prst="rect">
-            <a:avLst/>
-          </a:prstGeom>
-        </p:spPr>
-      </p:pic>
-      <p:pic>
-        <p:nvPicPr>
-          <p:cNvPr id="25" name="Picture 24" descr="Graphical user interface, application&#10;&#10;Description automatically generated">
-            <a:extLst>
-              <a:ext uri="{FF2B5EF4-FFF2-40B4-BE49-F238E27FC236}">
-                <a16:creationId xmlns:a16="http://schemas.microsoft.com/office/drawing/2014/main" id="{FB99C43F-7B7B-C143-BF28-74F44730085C}"/>
-              </a:ext>
-            </a:extLst>
-          </p:cNvPr>
-          <p:cNvPicPr>
-            <a:picLocks noChangeAspect="1"/>
-          </p:cNvPicPr>
-          <p:nvPr/>
-        </p:nvPicPr>
-        <p:blipFill rotWithShape="1">
-          <a:blip r:embed="rId4"/>
-          <a:srcRect l="13023" t="23939" r="50351" b="71747"/>
-          <a:stretch/>
-        </p:blipFill>
-        <p:spPr>
-          <a:xfrm>
-            <a:off x="4153677" y="2411110"/>
-            <a:ext cx="4272870" cy="375035"/>
-          </a:xfrm>
-          <a:prstGeom prst="rect">
-            <a:avLst/>
-          </a:prstGeom>
-        </p:spPr>
-      </p:pic>
       <p:sp>
         <p:nvSpPr>
           <p:cNvPr id="26" name="TextBox 25">
@@ -7138,6 +6999,241 @@
           </a:p>
         </p:txBody>
       </p:sp>
+      <p:sp>
+        <p:nvSpPr>
+          <p:cNvPr id="16" name="Rectangle 15">
+            <a:extLst>
+              <a:ext uri="{FF2B5EF4-FFF2-40B4-BE49-F238E27FC236}">
+                <a16:creationId xmlns:a16="http://schemas.microsoft.com/office/drawing/2014/main" id="{3BA95B9C-908A-3942-9905-DA59738A2007}"/>
+              </a:ext>
+            </a:extLst>
+          </p:cNvPr>
+          <p:cNvSpPr/>
+          <p:nvPr/>
+        </p:nvSpPr>
+        <p:spPr>
+          <a:xfrm>
+            <a:off x="7090439" y="3621820"/>
+            <a:ext cx="351046" cy="276498"/>
+          </a:xfrm>
+          <a:prstGeom prst="rect">
+            <a:avLst/>
+          </a:prstGeom>
+          <a:solidFill>
+            <a:schemeClr val="bg1"/>
+          </a:solidFill>
+          <a:ln>
+            <a:noFill/>
+          </a:ln>
+        </p:spPr>
+        <p:style>
+          <a:lnRef idx="2">
+            <a:schemeClr val="accent1">
+              <a:shade val="50000"/>
+            </a:schemeClr>
+          </a:lnRef>
+          <a:fillRef idx="1">
+            <a:schemeClr val="accent1"/>
+          </a:fillRef>
+          <a:effectRef idx="0">
+            <a:schemeClr val="accent1"/>
+          </a:effectRef>
+          <a:fontRef idx="minor">
+            <a:schemeClr val="lt1"/>
+          </a:fontRef>
+        </p:style>
+        <p:txBody>
+          <a:bodyPr rtlCol="0" anchor="ctr"/>
+          <a:lstStyle/>
+          <a:p>
+            <a:pPr marL="0" marR="0" lvl="0" indent="0" algn="ctr" defTabSz="457200" rtl="0" eaLnBrk="1" fontAlgn="auto" latinLnBrk="0" hangingPunct="1">
+              <a:lnSpc>
+                <a:spcPct val="100000"/>
+              </a:lnSpc>
+              <a:spcBef>
+                <a:spcPts val="0"/>
+              </a:spcBef>
+              <a:spcAft>
+                <a:spcPts val="0"/>
+              </a:spcAft>
+              <a:buClrTx/>
+              <a:buSzTx/>
+              <a:buFontTx/>
+              <a:buNone/>
+              <a:tabLst/>
+              <a:defRPr/>
+            </a:pPr>
+            <a:endParaRPr kumimoji="0" lang="en-US" sz="1800" b="0" i="0" u="none" strike="noStrike" kern="1200" cap="none" spc="0" normalizeH="0" baseline="0" noProof="0">
+              <a:ln>
+                <a:noFill/>
+              </a:ln>
+              <a:solidFill>
+                <a:prstClr val="white"/>
+              </a:solidFill>
+              <a:effectLst/>
+              <a:uLnTx/>
+              <a:uFillTx/>
+              <a:latin typeface="Calibri"/>
+              <a:ea typeface="+mn-ea"/>
+              <a:cs typeface="+mn-cs"/>
+            </a:endParaRPr>
+          </a:p>
+        </p:txBody>
+      </p:sp>
+      <p:pic>
+        <p:nvPicPr>
+          <p:cNvPr id="3" name="Picture 2" descr="A person wearing a mask&#10;&#10;Description automatically generated with low confidence">
+            <a:extLst>
+              <a:ext uri="{FF2B5EF4-FFF2-40B4-BE49-F238E27FC236}">
+                <a16:creationId xmlns:a16="http://schemas.microsoft.com/office/drawing/2014/main" id="{B36B5902-0ECA-1C4A-A9E2-9C1855E42EBA}"/>
+              </a:ext>
+            </a:extLst>
+          </p:cNvPr>
+          <p:cNvPicPr>
+            <a:picLocks noChangeAspect="1"/>
+          </p:cNvPicPr>
+          <p:nvPr/>
+        </p:nvPicPr>
+        <p:blipFill>
+          <a:blip r:embed="rId3"/>
+          <a:stretch>
+            <a:fillRect/>
+          </a:stretch>
+        </p:blipFill>
+        <p:spPr>
+          <a:xfrm>
+            <a:off x="2638467" y="2731248"/>
+            <a:ext cx="1581473" cy="1302610"/>
+          </a:xfrm>
+          <a:prstGeom prst="rect">
+            <a:avLst/>
+          </a:prstGeom>
+          <a:ln w="28575">
+            <a:solidFill>
+              <a:srgbClr val="FFFF00"/>
+            </a:solidFill>
+          </a:ln>
+        </p:spPr>
+      </p:pic>
+      <p:pic>
+        <p:nvPicPr>
+          <p:cNvPr id="24" name="Picture 23" descr="A person wearing a mask&#10;&#10;Description automatically generated with low confidence">
+            <a:extLst>
+              <a:ext uri="{FF2B5EF4-FFF2-40B4-BE49-F238E27FC236}">
+                <a16:creationId xmlns:a16="http://schemas.microsoft.com/office/drawing/2014/main" id="{DD2A531C-26E5-1542-9D2C-E2CCCD8F9FFA}"/>
+              </a:ext>
+            </a:extLst>
+          </p:cNvPr>
+          <p:cNvPicPr>
+            <a:picLocks noChangeAspect="1"/>
+          </p:cNvPicPr>
+          <p:nvPr/>
+        </p:nvPicPr>
+        <p:blipFill>
+          <a:blip r:embed="rId3"/>
+          <a:stretch>
+            <a:fillRect/>
+          </a:stretch>
+        </p:blipFill>
+        <p:spPr>
+          <a:xfrm>
+            <a:off x="4327386" y="2718808"/>
+            <a:ext cx="1581473" cy="1302610"/>
+          </a:xfrm>
+          <a:prstGeom prst="rect">
+            <a:avLst/>
+          </a:prstGeom>
+        </p:spPr>
+      </p:pic>
+      <p:pic>
+        <p:nvPicPr>
+          <p:cNvPr id="27" name="Picture 26" descr="A person wearing a mask&#10;&#10;Description automatically generated with low confidence">
+            <a:extLst>
+              <a:ext uri="{FF2B5EF4-FFF2-40B4-BE49-F238E27FC236}">
+                <a16:creationId xmlns:a16="http://schemas.microsoft.com/office/drawing/2014/main" id="{4DC2C7EF-4A75-474A-9775-AD5665402359}"/>
+              </a:ext>
+            </a:extLst>
+          </p:cNvPr>
+          <p:cNvPicPr>
+            <a:picLocks noChangeAspect="1"/>
+          </p:cNvPicPr>
+          <p:nvPr/>
+        </p:nvPicPr>
+        <p:blipFill>
+          <a:blip r:embed="rId3"/>
+          <a:stretch>
+            <a:fillRect/>
+          </a:stretch>
+        </p:blipFill>
+        <p:spPr>
+          <a:xfrm>
+            <a:off x="5991971" y="2711162"/>
+            <a:ext cx="1581473" cy="1302610"/>
+          </a:xfrm>
+          <a:prstGeom prst="rect">
+            <a:avLst/>
+          </a:prstGeom>
+        </p:spPr>
+      </p:pic>
+      <p:pic>
+        <p:nvPicPr>
+          <p:cNvPr id="28" name="Picture 27" descr="A person wearing a mask&#10;&#10;Description automatically generated with low confidence">
+            <a:extLst>
+              <a:ext uri="{FF2B5EF4-FFF2-40B4-BE49-F238E27FC236}">
+                <a16:creationId xmlns:a16="http://schemas.microsoft.com/office/drawing/2014/main" id="{8849EA0B-B471-3D4E-8C78-76837050FF31}"/>
+              </a:ext>
+            </a:extLst>
+          </p:cNvPr>
+          <p:cNvPicPr>
+            <a:picLocks noChangeAspect="1"/>
+          </p:cNvPicPr>
+          <p:nvPr/>
+        </p:nvPicPr>
+        <p:blipFill>
+          <a:blip r:embed="rId3"/>
+          <a:stretch>
+            <a:fillRect/>
+          </a:stretch>
+        </p:blipFill>
+        <p:spPr>
+          <a:xfrm>
+            <a:off x="7656556" y="2713901"/>
+            <a:ext cx="1581473" cy="1302610"/>
+          </a:xfrm>
+          <a:prstGeom prst="rect">
+            <a:avLst/>
+          </a:prstGeom>
+        </p:spPr>
+      </p:pic>
+      <p:pic>
+        <p:nvPicPr>
+          <p:cNvPr id="29" name="Picture 28" descr="Graphical user interface, application&#10;&#10;Description automatically generated">
+            <a:extLst>
+              <a:ext uri="{FF2B5EF4-FFF2-40B4-BE49-F238E27FC236}">
+                <a16:creationId xmlns:a16="http://schemas.microsoft.com/office/drawing/2014/main" id="{6A566880-3247-2647-967D-5C70D56C2A75}"/>
+              </a:ext>
+            </a:extLst>
+          </p:cNvPr>
+          <p:cNvPicPr>
+            <a:picLocks noChangeAspect="1"/>
+          </p:cNvPicPr>
+          <p:nvPr/>
+        </p:nvPicPr>
+        <p:blipFill rotWithShape="1">
+          <a:blip r:embed="rId4"/>
+          <a:srcRect l="13023" t="23939" r="50351" b="71747"/>
+          <a:stretch/>
+        </p:blipFill>
+        <p:spPr>
+          <a:xfrm>
+            <a:off x="3040034" y="2107637"/>
+            <a:ext cx="6156915" cy="540400"/>
+          </a:xfrm>
+          <a:prstGeom prst="rect">
+            <a:avLst/>
+          </a:prstGeom>
+        </p:spPr>
+      </p:pic>
     </p:spTree>
     <p:extLst>
       <p:ext uri="{BB962C8B-B14F-4D97-AF65-F5344CB8AC3E}">

</xml_diff>

<commit_message>
task data based on desiredGeneder form. default is male
</commit_message>
<xml_diff>
--- a/public/js/tasks/blind_dating/media/Blind_dating_game_instructions.pptx
+++ b/public/js/tasks/blind_dating/media/Blind_dating_game_instructions.pptx
@@ -229,7 +229,7 @@
           <a:p>
             <a:fld id="{5ACDFB13-8C7E-2148-B293-047F9641DD71}" type="datetimeFigureOut">
               <a:rPr lang="en-US" smtClean="0"/>
-              <a:t>7/27/22</a:t>
+              <a:t>7/29/22</a:t>
             </a:fld>
             <a:endParaRPr lang="en-US" dirty="0"/>
           </a:p>
@@ -3077,7 +3077,7 @@
           <a:p>
             <a:fld id="{E69A4D3A-6EF8-7448-AC6F-AD52FEDAA6A8}" type="datetimeFigureOut">
               <a:rPr lang="en-US" smtClean="0"/>
-              <a:t>7/27/22</a:t>
+              <a:t>7/29/22</a:t>
             </a:fld>
             <a:endParaRPr lang="en-US" dirty="0"/>
           </a:p>
@@ -3245,7 +3245,7 @@
           <a:p>
             <a:fld id="{E69A4D3A-6EF8-7448-AC6F-AD52FEDAA6A8}" type="datetimeFigureOut">
               <a:rPr lang="en-US" smtClean="0"/>
-              <a:t>7/27/22</a:t>
+              <a:t>7/29/22</a:t>
             </a:fld>
             <a:endParaRPr lang="en-US" dirty="0"/>
           </a:p>
@@ -3423,7 +3423,7 @@
           <a:p>
             <a:fld id="{E69A4D3A-6EF8-7448-AC6F-AD52FEDAA6A8}" type="datetimeFigureOut">
               <a:rPr lang="en-US" smtClean="0"/>
-              <a:t>7/27/22</a:t>
+              <a:t>7/29/22</a:t>
             </a:fld>
             <a:endParaRPr lang="en-US" dirty="0"/>
           </a:p>
@@ -3591,7 +3591,7 @@
           <a:p>
             <a:fld id="{E69A4D3A-6EF8-7448-AC6F-AD52FEDAA6A8}" type="datetimeFigureOut">
               <a:rPr lang="en-US" smtClean="0"/>
-              <a:t>7/27/22</a:t>
+              <a:t>7/29/22</a:t>
             </a:fld>
             <a:endParaRPr lang="en-US" dirty="0"/>
           </a:p>
@@ -3836,7 +3836,7 @@
           <a:p>
             <a:fld id="{E69A4D3A-6EF8-7448-AC6F-AD52FEDAA6A8}" type="datetimeFigureOut">
               <a:rPr lang="en-US" smtClean="0"/>
-              <a:t>7/27/22</a:t>
+              <a:t>7/29/22</a:t>
             </a:fld>
             <a:endParaRPr lang="en-US" dirty="0"/>
           </a:p>
@@ -4121,7 +4121,7 @@
           <a:p>
             <a:fld id="{E69A4D3A-6EF8-7448-AC6F-AD52FEDAA6A8}" type="datetimeFigureOut">
               <a:rPr lang="en-US" smtClean="0"/>
-              <a:t>7/27/22</a:t>
+              <a:t>7/29/22</a:t>
             </a:fld>
             <a:endParaRPr lang="en-US" dirty="0"/>
           </a:p>
@@ -4540,7 +4540,7 @@
           <a:p>
             <a:fld id="{E69A4D3A-6EF8-7448-AC6F-AD52FEDAA6A8}" type="datetimeFigureOut">
               <a:rPr lang="en-US" smtClean="0"/>
-              <a:t>7/27/22</a:t>
+              <a:t>7/29/22</a:t>
             </a:fld>
             <a:endParaRPr lang="en-US" dirty="0"/>
           </a:p>
@@ -4657,7 +4657,7 @@
           <a:p>
             <a:fld id="{E69A4D3A-6EF8-7448-AC6F-AD52FEDAA6A8}" type="datetimeFigureOut">
               <a:rPr lang="en-US" smtClean="0"/>
-              <a:t>7/27/22</a:t>
+              <a:t>7/29/22</a:t>
             </a:fld>
             <a:endParaRPr lang="en-US" dirty="0"/>
           </a:p>
@@ -4752,7 +4752,7 @@
           <a:p>
             <a:fld id="{E69A4D3A-6EF8-7448-AC6F-AD52FEDAA6A8}" type="datetimeFigureOut">
               <a:rPr lang="en-US" smtClean="0"/>
-              <a:t>7/27/22</a:t>
+              <a:t>7/29/22</a:t>
             </a:fld>
             <a:endParaRPr lang="en-US" dirty="0"/>
           </a:p>
@@ -5027,7 +5027,7 @@
           <a:p>
             <a:fld id="{E69A4D3A-6EF8-7448-AC6F-AD52FEDAA6A8}" type="datetimeFigureOut">
               <a:rPr lang="en-US" smtClean="0"/>
-              <a:t>7/27/22</a:t>
+              <a:t>7/29/22</a:t>
             </a:fld>
             <a:endParaRPr lang="en-US" dirty="0"/>
           </a:p>
@@ -5282,7 +5282,7 @@
           <a:p>
             <a:fld id="{E69A4D3A-6EF8-7448-AC6F-AD52FEDAA6A8}" type="datetimeFigureOut">
               <a:rPr lang="en-US" smtClean="0"/>
-              <a:t>7/27/22</a:t>
+              <a:t>7/29/22</a:t>
             </a:fld>
             <a:endParaRPr lang="en-US" dirty="0"/>
           </a:p>
@@ -5496,7 +5496,7 @@
           <a:p>
             <a:fld id="{E69A4D3A-6EF8-7448-AC6F-AD52FEDAA6A8}" type="datetimeFigureOut">
               <a:rPr lang="en-US" smtClean="0"/>
-              <a:t>7/27/22</a:t>
+              <a:t>7/29/22</a:t>
             </a:fld>
             <a:endParaRPr lang="en-US" dirty="0"/>
           </a:p>
@@ -19776,94 +19776,147 @@
           </p:txBody>
         </p:sp>
       </p:grpSp>
-      <p:pic>
-        <p:nvPicPr>
-          <p:cNvPr id="3" name="Picture 2" descr="Graphical user interface, application&#10;&#10;Description automatically generated">
+      <p:grpSp>
+        <p:nvGrpSpPr>
+          <p:cNvPr id="12" name="Group 11">
             <a:extLst>
               <a:ext uri="{FF2B5EF4-FFF2-40B4-BE49-F238E27FC236}">
-                <a16:creationId xmlns:a16="http://schemas.microsoft.com/office/drawing/2014/main" id="{8E621E4F-6AC9-CC4E-9CD5-AA30289F005B}"/>
+                <a16:creationId xmlns:a16="http://schemas.microsoft.com/office/drawing/2014/main" id="{F2E696C1-0EC1-9846-9B74-9B472C64AF77}"/>
               </a:ext>
             </a:extLst>
           </p:cNvPr>
-          <p:cNvPicPr>
-            <a:picLocks noChangeAspect="1"/>
-          </p:cNvPicPr>
+          <p:cNvGrpSpPr/>
           <p:nvPr/>
-        </p:nvPicPr>
-        <p:blipFill rotWithShape="1">
-          <a:blip r:embed="rId3"/>
-          <a:srcRect l="15336" t="5490" r="20662" b="55830"/>
-          <a:stretch/>
-        </p:blipFill>
-        <p:spPr>
+        </p:nvGrpSpPr>
+        <p:grpSpPr>
           <a:xfrm>
-            <a:off x="3546437" y="2981462"/>
-            <a:ext cx="5099126" cy="1836678"/>
+            <a:off x="3665354" y="3429000"/>
+            <a:ext cx="4861292" cy="970599"/>
+            <a:chOff x="1174269" y="3043959"/>
+            <a:chExt cx="4861292" cy="970599"/>
           </a:xfrm>
-          <a:prstGeom prst="rect">
-            <a:avLst/>
-          </a:prstGeom>
-        </p:spPr>
-      </p:pic>
-      <p:pic>
-        <p:nvPicPr>
-          <p:cNvPr id="5" name="Picture 4" descr="Icon&#10;&#10;Description automatically generated">
-            <a:extLst>
-              <a:ext uri="{FF2B5EF4-FFF2-40B4-BE49-F238E27FC236}">
-                <a16:creationId xmlns:a16="http://schemas.microsoft.com/office/drawing/2014/main" id="{01C08781-C553-F74B-8B16-21F9BD0DC057}"/>
-              </a:ext>
-            </a:extLst>
-          </p:cNvPr>
-          <p:cNvPicPr>
-            <a:picLocks noChangeAspect="1"/>
-          </p:cNvPicPr>
-          <p:nvPr/>
-        </p:nvPicPr>
-        <p:blipFill>
-          <a:blip r:embed="rId4"/>
-          <a:stretch>
-            <a:fillRect/>
-          </a:stretch>
-        </p:blipFill>
-        <p:spPr>
-          <a:xfrm>
-            <a:off x="4975157" y="3298341"/>
-            <a:ext cx="1172359" cy="1284013"/>
-          </a:xfrm>
-          <a:prstGeom prst="rect">
-            <a:avLst/>
-          </a:prstGeom>
-        </p:spPr>
-      </p:pic>
-      <p:pic>
-        <p:nvPicPr>
-          <p:cNvPr id="16" name="Picture 15" descr="Graphical user interface, application&#10;&#10;Description automatically generated">
-            <a:extLst>
-              <a:ext uri="{FF2B5EF4-FFF2-40B4-BE49-F238E27FC236}">
-                <a16:creationId xmlns:a16="http://schemas.microsoft.com/office/drawing/2014/main" id="{61611005-750D-6E4C-8D3F-FAB4FB9DFE9F}"/>
-              </a:ext>
-            </a:extLst>
-          </p:cNvPr>
-          <p:cNvPicPr>
-            <a:picLocks noChangeAspect="1"/>
-          </p:cNvPicPr>
-          <p:nvPr/>
-        </p:nvPicPr>
-        <p:blipFill rotWithShape="1">
-          <a:blip r:embed="rId5"/>
-          <a:srcRect l="13023" t="23939" r="50351" b="71747"/>
-          <a:stretch/>
-        </p:blipFill>
-        <p:spPr>
-          <a:xfrm>
-            <a:off x="4125542" y="3053965"/>
-            <a:ext cx="4272870" cy="375035"/>
-          </a:xfrm>
-          <a:prstGeom prst="rect">
-            <a:avLst/>
-          </a:prstGeom>
-        </p:spPr>
-      </p:pic>
+        </p:grpSpPr>
+        <p:pic>
+          <p:nvPicPr>
+            <p:cNvPr id="21" name="Picture 20" descr="A person wearing a mask&#10;&#10;Description automatically generated with low confidence">
+              <a:extLst>
+                <a:ext uri="{FF2B5EF4-FFF2-40B4-BE49-F238E27FC236}">
+                  <a16:creationId xmlns:a16="http://schemas.microsoft.com/office/drawing/2014/main" id="{8C36E34F-B11D-3040-AB09-E0644F43C2C7}"/>
+                </a:ext>
+              </a:extLst>
+            </p:cNvPr>
+            <p:cNvPicPr>
+              <a:picLocks noChangeAspect="1"/>
+            </p:cNvPicPr>
+            <p:nvPr/>
+          </p:nvPicPr>
+          <p:blipFill>
+            <a:blip r:embed="rId3"/>
+            <a:stretch>
+              <a:fillRect/>
+            </a:stretch>
+          </p:blipFill>
+          <p:spPr>
+            <a:xfrm>
+              <a:off x="1174269" y="3043959"/>
+              <a:ext cx="1178386" cy="970599"/>
+            </a:xfrm>
+            <a:prstGeom prst="rect">
+              <a:avLst/>
+            </a:prstGeom>
+          </p:spPr>
+        </p:pic>
+        <p:pic>
+          <p:nvPicPr>
+            <p:cNvPr id="22" name="Picture 21" descr="A person wearing a mask&#10;&#10;Description automatically generated with low confidence">
+              <a:extLst>
+                <a:ext uri="{FF2B5EF4-FFF2-40B4-BE49-F238E27FC236}">
+                  <a16:creationId xmlns:a16="http://schemas.microsoft.com/office/drawing/2014/main" id="{A17F9E53-AF25-EE4F-8E23-DC4AFB696D9B}"/>
+                </a:ext>
+              </a:extLst>
+            </p:cNvPr>
+            <p:cNvPicPr>
+              <a:picLocks noChangeAspect="1"/>
+            </p:cNvPicPr>
+            <p:nvPr/>
+          </p:nvPicPr>
+          <p:blipFill>
+            <a:blip r:embed="rId3"/>
+            <a:stretch>
+              <a:fillRect/>
+            </a:stretch>
+          </p:blipFill>
+          <p:spPr>
+            <a:xfrm>
+              <a:off x="2405846" y="3043959"/>
+              <a:ext cx="1178386" cy="970599"/>
+            </a:xfrm>
+            <a:prstGeom prst="rect">
+              <a:avLst/>
+            </a:prstGeom>
+          </p:spPr>
+        </p:pic>
+        <p:pic>
+          <p:nvPicPr>
+            <p:cNvPr id="23" name="Picture 22" descr="A person wearing a mask&#10;&#10;Description automatically generated with low confidence">
+              <a:extLst>
+                <a:ext uri="{FF2B5EF4-FFF2-40B4-BE49-F238E27FC236}">
+                  <a16:creationId xmlns:a16="http://schemas.microsoft.com/office/drawing/2014/main" id="{19E80556-6994-9643-8E77-766100E3617E}"/>
+                </a:ext>
+              </a:extLst>
+            </p:cNvPr>
+            <p:cNvPicPr>
+              <a:picLocks noChangeAspect="1"/>
+            </p:cNvPicPr>
+            <p:nvPr/>
+          </p:nvPicPr>
+          <p:blipFill>
+            <a:blip r:embed="rId3"/>
+            <a:stretch>
+              <a:fillRect/>
+            </a:stretch>
+          </p:blipFill>
+          <p:spPr>
+            <a:xfrm>
+              <a:off x="3637423" y="3043959"/>
+              <a:ext cx="1178386" cy="970599"/>
+            </a:xfrm>
+            <a:prstGeom prst="rect">
+              <a:avLst/>
+            </a:prstGeom>
+          </p:spPr>
+        </p:pic>
+        <p:pic>
+          <p:nvPicPr>
+            <p:cNvPr id="24" name="Picture 23" descr="A person wearing a mask&#10;&#10;Description automatically generated with low confidence">
+              <a:extLst>
+                <a:ext uri="{FF2B5EF4-FFF2-40B4-BE49-F238E27FC236}">
+                  <a16:creationId xmlns:a16="http://schemas.microsoft.com/office/drawing/2014/main" id="{C3C19FE4-F40E-AF49-8A62-0F83B661FB9C}"/>
+                </a:ext>
+              </a:extLst>
+            </p:cNvPr>
+            <p:cNvPicPr>
+              <a:picLocks noChangeAspect="1"/>
+            </p:cNvPicPr>
+            <p:nvPr/>
+          </p:nvPicPr>
+          <p:blipFill>
+            <a:blip r:embed="rId3"/>
+            <a:stretch>
+              <a:fillRect/>
+            </a:stretch>
+          </p:blipFill>
+          <p:spPr>
+            <a:xfrm>
+              <a:off x="4857175" y="3043959"/>
+              <a:ext cx="1178386" cy="970599"/>
+            </a:xfrm>
+            <a:prstGeom prst="rect">
+              <a:avLst/>
+            </a:prstGeom>
+          </p:spPr>
+        </p:pic>
+      </p:grpSp>
     </p:spTree>
     <p:extLst>
       <p:ext uri="{BB962C8B-B14F-4D97-AF65-F5344CB8AC3E}">
@@ -20525,116 +20578,267 @@
           </p:txBody>
         </p:sp>
       </p:grpSp>
-      <p:sp>
-        <p:nvSpPr>
-          <p:cNvPr id="22" name="Rectangle 21">
+      <p:grpSp>
+        <p:nvGrpSpPr>
+          <p:cNvPr id="2" name="Group 1">
             <a:extLst>
               <a:ext uri="{FF2B5EF4-FFF2-40B4-BE49-F238E27FC236}">
-                <a16:creationId xmlns:a16="http://schemas.microsoft.com/office/drawing/2014/main" id="{A16C7A9F-9658-BC44-AD6C-EA189B9D7E52}"/>
+                <a16:creationId xmlns:a16="http://schemas.microsoft.com/office/drawing/2014/main" id="{0641F8A9-1068-BC4D-9A11-D8C3DE6BEB53}"/>
               </a:ext>
             </a:extLst>
           </p:cNvPr>
-          <p:cNvSpPr/>
+          <p:cNvGrpSpPr/>
           <p:nvPr/>
-        </p:nvSpPr>
-        <p:spPr>
+        </p:nvGrpSpPr>
+        <p:grpSpPr>
           <a:xfrm>
-            <a:off x="7672815" y="3522659"/>
-            <a:ext cx="351046" cy="276498"/>
+            <a:off x="1174269" y="3043959"/>
+            <a:ext cx="9843461" cy="970599"/>
+            <a:chOff x="315379" y="2955191"/>
+            <a:chExt cx="12482053" cy="1230773"/>
           </a:xfrm>
-          <a:prstGeom prst="rect">
-            <a:avLst/>
-          </a:prstGeom>
-          <a:solidFill>
-            <a:schemeClr val="bg1"/>
-          </a:solidFill>
-          <a:ln>
-            <a:noFill/>
-          </a:ln>
-        </p:spPr>
-        <p:style>
-          <a:lnRef idx="2">
-            <a:schemeClr val="accent1">
-              <a:shade val="50000"/>
-            </a:schemeClr>
-          </a:lnRef>
-          <a:fillRef idx="1">
-            <a:schemeClr val="accent1"/>
-          </a:fillRef>
-          <a:effectRef idx="0">
-            <a:schemeClr val="accent1"/>
-          </a:effectRef>
-          <a:fontRef idx="minor">
-            <a:schemeClr val="lt1"/>
-          </a:fontRef>
-        </p:style>
-        <p:txBody>
-          <a:bodyPr rtlCol="0" anchor="ctr"/>
-          <a:lstStyle/>
-          <a:p>
-            <a:pPr algn="ctr"/>
-            <a:endParaRPr lang="en-US"/>
-          </a:p>
-        </p:txBody>
-      </p:sp>
-      <p:pic>
-        <p:nvPicPr>
-          <p:cNvPr id="23" name="Picture 22" descr="Graphical user interface&#10;&#10;Description automatically generated">
-            <a:extLst>
-              <a:ext uri="{FF2B5EF4-FFF2-40B4-BE49-F238E27FC236}">
-                <a16:creationId xmlns:a16="http://schemas.microsoft.com/office/drawing/2014/main" id="{BAA688E1-BD8F-CD4D-A3C5-12B3D88BB1D1}"/>
-              </a:ext>
-            </a:extLst>
-          </p:cNvPr>
-          <p:cNvPicPr>
-            <a:picLocks noChangeAspect="1"/>
-          </p:cNvPicPr>
-          <p:nvPr/>
-        </p:nvPicPr>
-        <p:blipFill rotWithShape="1">
-          <a:blip r:embed="rId3"/>
-          <a:srcRect l="8889" t="26039" r="8889" b="54353"/>
-          <a:stretch/>
-        </p:blipFill>
-        <p:spPr>
-          <a:xfrm>
-            <a:off x="1617216" y="2528495"/>
-            <a:ext cx="8957567" cy="1592355"/>
-          </a:xfrm>
-          <a:prstGeom prst="rect">
-            <a:avLst/>
-          </a:prstGeom>
-        </p:spPr>
-      </p:pic>
-      <p:pic>
-        <p:nvPicPr>
-          <p:cNvPr id="25" name="Picture 24" descr="Graphical user interface, application&#10;&#10;Description automatically generated">
-            <a:extLst>
-              <a:ext uri="{FF2B5EF4-FFF2-40B4-BE49-F238E27FC236}">
-                <a16:creationId xmlns:a16="http://schemas.microsoft.com/office/drawing/2014/main" id="{3A291A69-2B76-D448-A449-1B991D606420}"/>
-              </a:ext>
-            </a:extLst>
-          </p:cNvPr>
-          <p:cNvPicPr>
-            <a:picLocks noChangeAspect="1"/>
-          </p:cNvPicPr>
-          <p:nvPr/>
-        </p:nvPicPr>
-        <p:blipFill rotWithShape="1">
-          <a:blip r:embed="rId4"/>
-          <a:srcRect l="13023" t="23939" r="12488" b="72186"/>
-          <a:stretch/>
-        </p:blipFill>
-        <p:spPr>
-          <a:xfrm>
-            <a:off x="2080079" y="2349125"/>
-            <a:ext cx="8104930" cy="314244"/>
-          </a:xfrm>
-          <a:prstGeom prst="rect">
-            <a:avLst/>
-          </a:prstGeom>
-        </p:spPr>
-      </p:pic>
+        </p:grpSpPr>
+        <p:pic>
+          <p:nvPicPr>
+            <p:cNvPr id="13" name="Picture 12" descr="A person wearing a mask&#10;&#10;Description automatically generated with low confidence">
+              <a:extLst>
+                <a:ext uri="{FF2B5EF4-FFF2-40B4-BE49-F238E27FC236}">
+                  <a16:creationId xmlns:a16="http://schemas.microsoft.com/office/drawing/2014/main" id="{B8156BD0-FF24-B346-A14E-18077689C91C}"/>
+                </a:ext>
+              </a:extLst>
+            </p:cNvPr>
+            <p:cNvPicPr>
+              <a:picLocks noChangeAspect="1"/>
+            </p:cNvPicPr>
+            <p:nvPr/>
+          </p:nvPicPr>
+          <p:blipFill>
+            <a:blip r:embed="rId3"/>
+            <a:stretch>
+              <a:fillRect/>
+            </a:stretch>
+          </p:blipFill>
+          <p:spPr>
+            <a:xfrm>
+              <a:off x="315379" y="2955191"/>
+              <a:ext cx="1494258" cy="1230773"/>
+            </a:xfrm>
+            <a:prstGeom prst="rect">
+              <a:avLst/>
+            </a:prstGeom>
+          </p:spPr>
+        </p:pic>
+        <p:pic>
+          <p:nvPicPr>
+            <p:cNvPr id="16" name="Picture 15" descr="A person wearing a mask&#10;&#10;Description automatically generated with low confidence">
+              <a:extLst>
+                <a:ext uri="{FF2B5EF4-FFF2-40B4-BE49-F238E27FC236}">
+                  <a16:creationId xmlns:a16="http://schemas.microsoft.com/office/drawing/2014/main" id="{CF19374D-609F-E243-8776-852F67083855}"/>
+                </a:ext>
+              </a:extLst>
+            </p:cNvPr>
+            <p:cNvPicPr>
+              <a:picLocks noChangeAspect="1"/>
+            </p:cNvPicPr>
+            <p:nvPr/>
+          </p:nvPicPr>
+          <p:blipFill>
+            <a:blip r:embed="rId3"/>
+            <a:stretch>
+              <a:fillRect/>
+            </a:stretch>
+          </p:blipFill>
+          <p:spPr>
+            <a:xfrm>
+              <a:off x="1877087" y="2955191"/>
+              <a:ext cx="1494258" cy="1230773"/>
+            </a:xfrm>
+            <a:prstGeom prst="rect">
+              <a:avLst/>
+            </a:prstGeom>
+          </p:spPr>
+        </p:pic>
+        <p:pic>
+          <p:nvPicPr>
+            <p:cNvPr id="20" name="Picture 19" descr="A person wearing a mask&#10;&#10;Description automatically generated with low confidence">
+              <a:extLst>
+                <a:ext uri="{FF2B5EF4-FFF2-40B4-BE49-F238E27FC236}">
+                  <a16:creationId xmlns:a16="http://schemas.microsoft.com/office/drawing/2014/main" id="{149DC621-EEDB-4D4E-B963-D1886E498022}"/>
+                </a:ext>
+              </a:extLst>
+            </p:cNvPr>
+            <p:cNvPicPr>
+              <a:picLocks noChangeAspect="1"/>
+            </p:cNvPicPr>
+            <p:nvPr/>
+          </p:nvPicPr>
+          <p:blipFill>
+            <a:blip r:embed="rId3"/>
+            <a:stretch>
+              <a:fillRect/>
+            </a:stretch>
+          </p:blipFill>
+          <p:spPr>
+            <a:xfrm>
+              <a:off x="3438795" y="2955191"/>
+              <a:ext cx="1494258" cy="1230773"/>
+            </a:xfrm>
+            <a:prstGeom prst="rect">
+              <a:avLst/>
+            </a:prstGeom>
+          </p:spPr>
+        </p:pic>
+        <p:pic>
+          <p:nvPicPr>
+            <p:cNvPr id="21" name="Picture 20" descr="A person wearing a mask&#10;&#10;Description automatically generated with low confidence">
+              <a:extLst>
+                <a:ext uri="{FF2B5EF4-FFF2-40B4-BE49-F238E27FC236}">
+                  <a16:creationId xmlns:a16="http://schemas.microsoft.com/office/drawing/2014/main" id="{66BC36A4-00D2-224F-96A4-DA09169D4F86}"/>
+                </a:ext>
+              </a:extLst>
+            </p:cNvPr>
+            <p:cNvPicPr>
+              <a:picLocks noChangeAspect="1"/>
+            </p:cNvPicPr>
+            <p:nvPr/>
+          </p:nvPicPr>
+          <p:blipFill>
+            <a:blip r:embed="rId3"/>
+            <a:stretch>
+              <a:fillRect/>
+            </a:stretch>
+          </p:blipFill>
+          <p:spPr>
+            <a:xfrm>
+              <a:off x="5019116" y="2955191"/>
+              <a:ext cx="1494258" cy="1230773"/>
+            </a:xfrm>
+            <a:prstGeom prst="rect">
+              <a:avLst/>
+            </a:prstGeom>
+          </p:spPr>
+        </p:pic>
+        <p:pic>
+          <p:nvPicPr>
+            <p:cNvPr id="24" name="Picture 23" descr="A person wearing a mask&#10;&#10;Description automatically generated with low confidence">
+              <a:extLst>
+                <a:ext uri="{FF2B5EF4-FFF2-40B4-BE49-F238E27FC236}">
+                  <a16:creationId xmlns:a16="http://schemas.microsoft.com/office/drawing/2014/main" id="{CACA5DD5-1BEB-B941-ACEE-D229C6CC1FC8}"/>
+                </a:ext>
+              </a:extLst>
+            </p:cNvPr>
+            <p:cNvPicPr>
+              <a:picLocks noChangeAspect="1"/>
+            </p:cNvPicPr>
+            <p:nvPr/>
+          </p:nvPicPr>
+          <p:blipFill>
+            <a:blip r:embed="rId3"/>
+            <a:stretch>
+              <a:fillRect/>
+            </a:stretch>
+          </p:blipFill>
+          <p:spPr>
+            <a:xfrm>
+              <a:off x="6599437" y="2955191"/>
+              <a:ext cx="1494258" cy="1230773"/>
+            </a:xfrm>
+            <a:prstGeom prst="rect">
+              <a:avLst/>
+            </a:prstGeom>
+          </p:spPr>
+        </p:pic>
+        <p:pic>
+          <p:nvPicPr>
+            <p:cNvPr id="26" name="Picture 25" descr="A person wearing a mask&#10;&#10;Description automatically generated with low confidence">
+              <a:extLst>
+                <a:ext uri="{FF2B5EF4-FFF2-40B4-BE49-F238E27FC236}">
+                  <a16:creationId xmlns:a16="http://schemas.microsoft.com/office/drawing/2014/main" id="{9CD35228-D182-4148-9C39-127C95030C46}"/>
+                </a:ext>
+              </a:extLst>
+            </p:cNvPr>
+            <p:cNvPicPr>
+              <a:picLocks noChangeAspect="1"/>
+            </p:cNvPicPr>
+            <p:nvPr/>
+          </p:nvPicPr>
+          <p:blipFill>
+            <a:blip r:embed="rId3"/>
+            <a:stretch>
+              <a:fillRect/>
+            </a:stretch>
+          </p:blipFill>
+          <p:spPr>
+            <a:xfrm>
+              <a:off x="8161145" y="2955191"/>
+              <a:ext cx="1494258" cy="1230773"/>
+            </a:xfrm>
+            <a:prstGeom prst="rect">
+              <a:avLst/>
+            </a:prstGeom>
+          </p:spPr>
+        </p:pic>
+        <p:pic>
+          <p:nvPicPr>
+            <p:cNvPr id="27" name="Picture 26" descr="A person wearing a mask&#10;&#10;Description automatically generated with low confidence">
+              <a:extLst>
+                <a:ext uri="{FF2B5EF4-FFF2-40B4-BE49-F238E27FC236}">
+                  <a16:creationId xmlns:a16="http://schemas.microsoft.com/office/drawing/2014/main" id="{AC0A0E79-988C-EB4D-957D-A251E4B84326}"/>
+                </a:ext>
+              </a:extLst>
+            </p:cNvPr>
+            <p:cNvPicPr>
+              <a:picLocks noChangeAspect="1"/>
+            </p:cNvPicPr>
+            <p:nvPr/>
+          </p:nvPicPr>
+          <p:blipFill>
+            <a:blip r:embed="rId3"/>
+            <a:stretch>
+              <a:fillRect/>
+            </a:stretch>
+          </p:blipFill>
+          <p:spPr>
+            <a:xfrm>
+              <a:off x="9722853" y="2955191"/>
+              <a:ext cx="1494258" cy="1230773"/>
+            </a:xfrm>
+            <a:prstGeom prst="rect">
+              <a:avLst/>
+            </a:prstGeom>
+          </p:spPr>
+        </p:pic>
+        <p:pic>
+          <p:nvPicPr>
+            <p:cNvPr id="28" name="Picture 27" descr="A person wearing a mask&#10;&#10;Description automatically generated with low confidence">
+              <a:extLst>
+                <a:ext uri="{FF2B5EF4-FFF2-40B4-BE49-F238E27FC236}">
+                  <a16:creationId xmlns:a16="http://schemas.microsoft.com/office/drawing/2014/main" id="{5937BF69-7433-FD40-991F-A12C0465DD3F}"/>
+                </a:ext>
+              </a:extLst>
+            </p:cNvPr>
+            <p:cNvPicPr>
+              <a:picLocks noChangeAspect="1"/>
+            </p:cNvPicPr>
+            <p:nvPr/>
+          </p:nvPicPr>
+          <p:blipFill>
+            <a:blip r:embed="rId3"/>
+            <a:stretch>
+              <a:fillRect/>
+            </a:stretch>
+          </p:blipFill>
+          <p:spPr>
+            <a:xfrm>
+              <a:off x="11303174" y="2955191"/>
+              <a:ext cx="1494258" cy="1230773"/>
+            </a:xfrm>
+            <a:prstGeom prst="rect">
+              <a:avLst/>
+            </a:prstGeom>
+          </p:spPr>
+        </p:pic>
+      </p:grpSp>
     </p:spTree>
     <p:extLst>
       <p:ext uri="{BB962C8B-B14F-4D97-AF65-F5344CB8AC3E}">

</xml_diff>

<commit_message>
updated instructions slides to match with new images
</commit_message>
<xml_diff>
--- a/public/js/tasks/blind_dating/media/Blind_dating_game_instructions.pptx
+++ b/public/js/tasks/blind_dating/media/Blind_dating_game_instructions.pptx
@@ -229,7 +229,7 @@
           <a:p>
             <a:fld id="{5ACDFB13-8C7E-2148-B293-047F9641DD71}" type="datetimeFigureOut">
               <a:rPr lang="en-US" smtClean="0"/>
-              <a:t>7/29/22</a:t>
+              <a:t>8/4/22</a:t>
             </a:fld>
             <a:endParaRPr lang="en-US" dirty="0"/>
           </a:p>
@@ -3077,7 +3077,7 @@
           <a:p>
             <a:fld id="{E69A4D3A-6EF8-7448-AC6F-AD52FEDAA6A8}" type="datetimeFigureOut">
               <a:rPr lang="en-US" smtClean="0"/>
-              <a:t>7/29/22</a:t>
+              <a:t>8/4/22</a:t>
             </a:fld>
             <a:endParaRPr lang="en-US" dirty="0"/>
           </a:p>
@@ -3245,7 +3245,7 @@
           <a:p>
             <a:fld id="{E69A4D3A-6EF8-7448-AC6F-AD52FEDAA6A8}" type="datetimeFigureOut">
               <a:rPr lang="en-US" smtClean="0"/>
-              <a:t>7/29/22</a:t>
+              <a:t>8/4/22</a:t>
             </a:fld>
             <a:endParaRPr lang="en-US" dirty="0"/>
           </a:p>
@@ -3423,7 +3423,7 @@
           <a:p>
             <a:fld id="{E69A4D3A-6EF8-7448-AC6F-AD52FEDAA6A8}" type="datetimeFigureOut">
               <a:rPr lang="en-US" smtClean="0"/>
-              <a:t>7/29/22</a:t>
+              <a:t>8/4/22</a:t>
             </a:fld>
             <a:endParaRPr lang="en-US" dirty="0"/>
           </a:p>
@@ -3591,7 +3591,7 @@
           <a:p>
             <a:fld id="{E69A4D3A-6EF8-7448-AC6F-AD52FEDAA6A8}" type="datetimeFigureOut">
               <a:rPr lang="en-US" smtClean="0"/>
-              <a:t>7/29/22</a:t>
+              <a:t>8/4/22</a:t>
             </a:fld>
             <a:endParaRPr lang="en-US" dirty="0"/>
           </a:p>
@@ -3836,7 +3836,7 @@
           <a:p>
             <a:fld id="{E69A4D3A-6EF8-7448-AC6F-AD52FEDAA6A8}" type="datetimeFigureOut">
               <a:rPr lang="en-US" smtClean="0"/>
-              <a:t>7/29/22</a:t>
+              <a:t>8/4/22</a:t>
             </a:fld>
             <a:endParaRPr lang="en-US" dirty="0"/>
           </a:p>
@@ -4121,7 +4121,7 @@
           <a:p>
             <a:fld id="{E69A4D3A-6EF8-7448-AC6F-AD52FEDAA6A8}" type="datetimeFigureOut">
               <a:rPr lang="en-US" smtClean="0"/>
-              <a:t>7/29/22</a:t>
+              <a:t>8/4/22</a:t>
             </a:fld>
             <a:endParaRPr lang="en-US" dirty="0"/>
           </a:p>
@@ -4540,7 +4540,7 @@
           <a:p>
             <a:fld id="{E69A4D3A-6EF8-7448-AC6F-AD52FEDAA6A8}" type="datetimeFigureOut">
               <a:rPr lang="en-US" smtClean="0"/>
-              <a:t>7/29/22</a:t>
+              <a:t>8/4/22</a:t>
             </a:fld>
             <a:endParaRPr lang="en-US" dirty="0"/>
           </a:p>
@@ -4657,7 +4657,7 @@
           <a:p>
             <a:fld id="{E69A4D3A-6EF8-7448-AC6F-AD52FEDAA6A8}" type="datetimeFigureOut">
               <a:rPr lang="en-US" smtClean="0"/>
-              <a:t>7/29/22</a:t>
+              <a:t>8/4/22</a:t>
             </a:fld>
             <a:endParaRPr lang="en-US" dirty="0"/>
           </a:p>
@@ -4752,7 +4752,7 @@
           <a:p>
             <a:fld id="{E69A4D3A-6EF8-7448-AC6F-AD52FEDAA6A8}" type="datetimeFigureOut">
               <a:rPr lang="en-US" smtClean="0"/>
-              <a:t>7/29/22</a:t>
+              <a:t>8/4/22</a:t>
             </a:fld>
             <a:endParaRPr lang="en-US" dirty="0"/>
           </a:p>
@@ -5027,7 +5027,7 @@
           <a:p>
             <a:fld id="{E69A4D3A-6EF8-7448-AC6F-AD52FEDAA6A8}" type="datetimeFigureOut">
               <a:rPr lang="en-US" smtClean="0"/>
-              <a:t>7/29/22</a:t>
+              <a:t>8/4/22</a:t>
             </a:fld>
             <a:endParaRPr lang="en-US" dirty="0"/>
           </a:p>
@@ -5282,7 +5282,7 @@
           <a:p>
             <a:fld id="{E69A4D3A-6EF8-7448-AC6F-AD52FEDAA6A8}" type="datetimeFigureOut">
               <a:rPr lang="en-US" smtClean="0"/>
-              <a:t>7/29/22</a:t>
+              <a:t>8/4/22</a:t>
             </a:fld>
             <a:endParaRPr lang="en-US" dirty="0"/>
           </a:p>
@@ -5496,7 +5496,7 @@
           <a:p>
             <a:fld id="{E69A4D3A-6EF8-7448-AC6F-AD52FEDAA6A8}" type="datetimeFigureOut">
               <a:rPr lang="en-US" smtClean="0"/>
-              <a:t>7/29/22</a:t>
+              <a:t>8/4/22</a:t>
             </a:fld>
             <a:endParaRPr lang="en-US" dirty="0"/>
           </a:p>
@@ -7109,100 +7109,8 @@
             <a:avLst/>
           </a:prstGeom>
           <a:ln w="28575">
-            <a:solidFill>
-              <a:srgbClr val="FFFF00"/>
-            </a:solidFill>
+            <a:noFill/>
           </a:ln>
-        </p:spPr>
-      </p:pic>
-      <p:pic>
-        <p:nvPicPr>
-          <p:cNvPr id="24" name="Picture 23" descr="A person wearing a mask&#10;&#10;Description automatically generated with low confidence">
-            <a:extLst>
-              <a:ext uri="{FF2B5EF4-FFF2-40B4-BE49-F238E27FC236}">
-                <a16:creationId xmlns:a16="http://schemas.microsoft.com/office/drawing/2014/main" id="{DD2A531C-26E5-1542-9D2C-E2CCCD8F9FFA}"/>
-              </a:ext>
-            </a:extLst>
-          </p:cNvPr>
-          <p:cNvPicPr>
-            <a:picLocks noChangeAspect="1"/>
-          </p:cNvPicPr>
-          <p:nvPr/>
-        </p:nvPicPr>
-        <p:blipFill>
-          <a:blip r:embed="rId3"/>
-          <a:stretch>
-            <a:fillRect/>
-          </a:stretch>
-        </p:blipFill>
-        <p:spPr>
-          <a:xfrm>
-            <a:off x="4327386" y="2718808"/>
-            <a:ext cx="1581473" cy="1302610"/>
-          </a:xfrm>
-          <a:prstGeom prst="rect">
-            <a:avLst/>
-          </a:prstGeom>
-        </p:spPr>
-      </p:pic>
-      <p:pic>
-        <p:nvPicPr>
-          <p:cNvPr id="27" name="Picture 26" descr="A person wearing a mask&#10;&#10;Description automatically generated with low confidence">
-            <a:extLst>
-              <a:ext uri="{FF2B5EF4-FFF2-40B4-BE49-F238E27FC236}">
-                <a16:creationId xmlns:a16="http://schemas.microsoft.com/office/drawing/2014/main" id="{4DC2C7EF-4A75-474A-9775-AD5665402359}"/>
-              </a:ext>
-            </a:extLst>
-          </p:cNvPr>
-          <p:cNvPicPr>
-            <a:picLocks noChangeAspect="1"/>
-          </p:cNvPicPr>
-          <p:nvPr/>
-        </p:nvPicPr>
-        <p:blipFill>
-          <a:blip r:embed="rId3"/>
-          <a:stretch>
-            <a:fillRect/>
-          </a:stretch>
-        </p:blipFill>
-        <p:spPr>
-          <a:xfrm>
-            <a:off x="5991971" y="2711162"/>
-            <a:ext cx="1581473" cy="1302610"/>
-          </a:xfrm>
-          <a:prstGeom prst="rect">
-            <a:avLst/>
-          </a:prstGeom>
-        </p:spPr>
-      </p:pic>
-      <p:pic>
-        <p:nvPicPr>
-          <p:cNvPr id="28" name="Picture 27" descr="A person wearing a mask&#10;&#10;Description automatically generated with low confidence">
-            <a:extLst>
-              <a:ext uri="{FF2B5EF4-FFF2-40B4-BE49-F238E27FC236}">
-                <a16:creationId xmlns:a16="http://schemas.microsoft.com/office/drawing/2014/main" id="{8849EA0B-B471-3D4E-8C78-76837050FF31}"/>
-              </a:ext>
-            </a:extLst>
-          </p:cNvPr>
-          <p:cNvPicPr>
-            <a:picLocks noChangeAspect="1"/>
-          </p:cNvPicPr>
-          <p:nvPr/>
-        </p:nvPicPr>
-        <p:blipFill>
-          <a:blip r:embed="rId3"/>
-          <a:stretch>
-            <a:fillRect/>
-          </a:stretch>
-        </p:blipFill>
-        <p:spPr>
-          <a:xfrm>
-            <a:off x="7656556" y="2713901"/>
-            <a:ext cx="1581473" cy="1302610"/>
-          </a:xfrm>
-          <a:prstGeom prst="rect">
-            <a:avLst/>
-          </a:prstGeom>
         </p:spPr>
       </p:pic>
       <p:pic>
@@ -7232,6 +7140,107 @@
           <a:prstGeom prst="rect">
             <a:avLst/>
           </a:prstGeom>
+        </p:spPr>
+      </p:pic>
+      <p:pic>
+        <p:nvPicPr>
+          <p:cNvPr id="23" name="Picture 22" descr="A person wearing a mask&#10;&#10;Description automatically generated with low confidence">
+            <a:extLst>
+              <a:ext uri="{FF2B5EF4-FFF2-40B4-BE49-F238E27FC236}">
+                <a16:creationId xmlns:a16="http://schemas.microsoft.com/office/drawing/2014/main" id="{9AE88937-05AD-0344-95B5-17CA6C99F91F}"/>
+              </a:ext>
+            </a:extLst>
+          </p:cNvPr>
+          <p:cNvPicPr>
+            <a:picLocks noChangeAspect="1"/>
+          </p:cNvPicPr>
+          <p:nvPr/>
+        </p:nvPicPr>
+        <p:blipFill>
+          <a:blip r:embed="rId3"/>
+          <a:stretch>
+            <a:fillRect/>
+          </a:stretch>
+        </p:blipFill>
+        <p:spPr>
+          <a:xfrm>
+            <a:off x="4310825" y="2724965"/>
+            <a:ext cx="1581473" cy="1302610"/>
+          </a:xfrm>
+          <a:prstGeom prst="rect">
+            <a:avLst/>
+          </a:prstGeom>
+          <a:ln w="38100">
+            <a:solidFill>
+              <a:srgbClr val="FFFF00"/>
+            </a:solidFill>
+          </a:ln>
+        </p:spPr>
+      </p:pic>
+      <p:pic>
+        <p:nvPicPr>
+          <p:cNvPr id="25" name="Picture 24" descr="A person wearing a mask&#10;&#10;Description automatically generated with low confidence">
+            <a:extLst>
+              <a:ext uri="{FF2B5EF4-FFF2-40B4-BE49-F238E27FC236}">
+                <a16:creationId xmlns:a16="http://schemas.microsoft.com/office/drawing/2014/main" id="{B81C0B28-56BC-144C-BF6C-BC86C0F8204E}"/>
+              </a:ext>
+            </a:extLst>
+          </p:cNvPr>
+          <p:cNvPicPr>
+            <a:picLocks noChangeAspect="1"/>
+          </p:cNvPicPr>
+          <p:nvPr/>
+        </p:nvPicPr>
+        <p:blipFill>
+          <a:blip r:embed="rId3"/>
+          <a:stretch>
+            <a:fillRect/>
+          </a:stretch>
+        </p:blipFill>
+        <p:spPr>
+          <a:xfrm>
+            <a:off x="5983183" y="2724965"/>
+            <a:ext cx="1581473" cy="1302610"/>
+          </a:xfrm>
+          <a:prstGeom prst="rect">
+            <a:avLst/>
+          </a:prstGeom>
+          <a:ln w="28575">
+            <a:noFill/>
+          </a:ln>
+        </p:spPr>
+      </p:pic>
+      <p:pic>
+        <p:nvPicPr>
+          <p:cNvPr id="30" name="Picture 29" descr="A person wearing a mask&#10;&#10;Description automatically generated with low confidence">
+            <a:extLst>
+              <a:ext uri="{FF2B5EF4-FFF2-40B4-BE49-F238E27FC236}">
+                <a16:creationId xmlns:a16="http://schemas.microsoft.com/office/drawing/2014/main" id="{9216CD5A-C79C-4B40-B639-92A4F021ACE3}"/>
+              </a:ext>
+            </a:extLst>
+          </p:cNvPr>
+          <p:cNvPicPr>
+            <a:picLocks noChangeAspect="1"/>
+          </p:cNvPicPr>
+          <p:nvPr/>
+        </p:nvPicPr>
+        <p:blipFill>
+          <a:blip r:embed="rId3"/>
+          <a:stretch>
+            <a:fillRect/>
+          </a:stretch>
+        </p:blipFill>
+        <p:spPr>
+          <a:xfrm>
+            <a:off x="7656556" y="2724965"/>
+            <a:ext cx="1581473" cy="1302610"/>
+          </a:xfrm>
+          <a:prstGeom prst="rect">
+            <a:avLst/>
+          </a:prstGeom>
+          <a:ln w="28575">
+            <a:noFill/>
+          </a:ln>
         </p:spPr>
       </p:pic>
     </p:spTree>
@@ -7290,7 +7299,7 @@
         </p:nvSpPr>
         <p:spPr>
           <a:xfrm>
-            <a:off x="840890" y="450398"/>
+            <a:off x="840888" y="313327"/>
             <a:ext cx="10510220" cy="1856486"/>
           </a:xfrm>
         </p:spPr>
@@ -7305,17 +7314,13 @@
             </a:pPr>
             <a:r>
               <a:rPr lang="en-US" dirty="0"/>
-              <a:t>Once you see the “select” or “wait” options, you will have </a:t>
+              <a:t>Once you see the “accept” or “reject” options, you will have </a:t>
             </a:r>
           </a:p>
           <a:p>
             <a:pPr marL="0" indent="0">
               <a:buNone/>
             </a:pPr>
-            <a:r>
-              <a:rPr lang="en-US" b="1" u="sng" dirty="0"/>
-              <a:t>5 seconds </a:t>
-            </a:r>
             <a:r>
               <a:rPr lang="en-US" dirty="0"/>
               <a:t>to decide to select this person for a date or to wait and see if a better match comes along. </a:t>
@@ -7989,64 +7994,6 @@
           </a:p>
         </p:txBody>
       </p:sp>
-      <p:pic>
-        <p:nvPicPr>
-          <p:cNvPr id="18" name="Picture 17" descr="Graphical user interface, application&#10;&#10;Description automatically generated">
-            <a:extLst>
-              <a:ext uri="{FF2B5EF4-FFF2-40B4-BE49-F238E27FC236}">
-                <a16:creationId xmlns:a16="http://schemas.microsoft.com/office/drawing/2014/main" id="{AD300D3A-7D09-A646-8981-0B63BD2540E7}"/>
-              </a:ext>
-            </a:extLst>
-          </p:cNvPr>
-          <p:cNvPicPr>
-            <a:picLocks noChangeAspect="1"/>
-          </p:cNvPicPr>
-          <p:nvPr/>
-        </p:nvPicPr>
-        <p:blipFill rotWithShape="1">
-          <a:blip r:embed="rId3"/>
-          <a:srcRect l="15336" t="5490" r="20662" b="55830"/>
-          <a:stretch/>
-        </p:blipFill>
-        <p:spPr>
-          <a:xfrm>
-            <a:off x="3546437" y="2346659"/>
-            <a:ext cx="5099126" cy="1836678"/>
-          </a:xfrm>
-          <a:prstGeom prst="rect">
-            <a:avLst/>
-          </a:prstGeom>
-        </p:spPr>
-      </p:pic>
-      <p:pic>
-        <p:nvPicPr>
-          <p:cNvPr id="19" name="Picture 18" descr="Graphical user interface, application&#10;&#10;Description automatically generated">
-            <a:extLst>
-              <a:ext uri="{FF2B5EF4-FFF2-40B4-BE49-F238E27FC236}">
-                <a16:creationId xmlns:a16="http://schemas.microsoft.com/office/drawing/2014/main" id="{59248360-8B4C-844D-8A4F-32F066EA041A}"/>
-              </a:ext>
-            </a:extLst>
-          </p:cNvPr>
-          <p:cNvPicPr>
-            <a:picLocks noChangeAspect="1"/>
-          </p:cNvPicPr>
-          <p:nvPr/>
-        </p:nvPicPr>
-        <p:blipFill rotWithShape="1">
-          <a:blip r:embed="rId4"/>
-          <a:srcRect l="13023" t="23939" r="50351" b="71747"/>
-          <a:stretch/>
-        </p:blipFill>
-        <p:spPr>
-          <a:xfrm>
-            <a:off x="4153677" y="2411110"/>
-            <a:ext cx="4272870" cy="375035"/>
-          </a:xfrm>
-          <a:prstGeom prst="rect">
-            <a:avLst/>
-          </a:prstGeom>
-        </p:spPr>
-      </p:pic>
       <p:sp>
         <p:nvSpPr>
           <p:cNvPr id="20" name="TextBox 19">
@@ -8087,10 +8034,43 @@
       </p:sp>
       <p:pic>
         <p:nvPicPr>
-          <p:cNvPr id="3" name="Picture 2" descr="Graphical user interface, application&#10;&#10;Description automatically generated">
+          <p:cNvPr id="16" name="Picture 15" descr="A person wearing a mask&#10;&#10;Description automatically generated with low confidence">
             <a:extLst>
               <a:ext uri="{FF2B5EF4-FFF2-40B4-BE49-F238E27FC236}">
-                <a16:creationId xmlns:a16="http://schemas.microsoft.com/office/drawing/2014/main" id="{0237FEF2-0505-6641-B00D-4F49E9F13AB2}"/>
+                <a16:creationId xmlns:a16="http://schemas.microsoft.com/office/drawing/2014/main" id="{91F390F5-615C-CC43-BEAE-4205791E5142}"/>
+              </a:ext>
+            </a:extLst>
+          </p:cNvPr>
+          <p:cNvPicPr>
+            <a:picLocks noChangeAspect="1"/>
+          </p:cNvPicPr>
+          <p:nvPr/>
+        </p:nvPicPr>
+        <p:blipFill>
+          <a:blip r:embed="rId3"/>
+          <a:stretch>
+            <a:fillRect/>
+          </a:stretch>
+        </p:blipFill>
+        <p:spPr>
+          <a:xfrm>
+            <a:off x="2638467" y="2731248"/>
+            <a:ext cx="1581473" cy="1302610"/>
+          </a:xfrm>
+          <a:prstGeom prst="rect">
+            <a:avLst/>
+          </a:prstGeom>
+          <a:ln w="28575">
+            <a:noFill/>
+          </a:ln>
+        </p:spPr>
+      </p:pic>
+      <p:pic>
+        <p:nvPicPr>
+          <p:cNvPr id="21" name="Picture 20" descr="Graphical user interface, application&#10;&#10;Description automatically generated">
+            <a:extLst>
+              <a:ext uri="{FF2B5EF4-FFF2-40B4-BE49-F238E27FC236}">
+                <a16:creationId xmlns:a16="http://schemas.microsoft.com/office/drawing/2014/main" id="{15DABE97-677A-ED4D-8C1F-86681CA17337}"/>
               </a:ext>
             </a:extLst>
           </p:cNvPr>
@@ -8100,14 +8080,145 @@
           <p:nvPr/>
         </p:nvPicPr>
         <p:blipFill rotWithShape="1">
-          <a:blip r:embed="rId5"/>
-          <a:srcRect l="31447" t="62714" r="31720" b="28941"/>
+          <a:blip r:embed="rId4"/>
+          <a:srcRect l="13023" t="23939" r="50351" b="71747"/>
           <a:stretch/>
         </p:blipFill>
         <p:spPr>
           <a:xfrm>
-            <a:off x="3672166" y="4929568"/>
-            <a:ext cx="4847666" cy="818695"/>
+            <a:off x="3040034" y="2107637"/>
+            <a:ext cx="6156915" cy="540400"/>
+          </a:xfrm>
+          <a:prstGeom prst="rect">
+            <a:avLst/>
+          </a:prstGeom>
+        </p:spPr>
+      </p:pic>
+      <p:pic>
+        <p:nvPicPr>
+          <p:cNvPr id="22" name="Picture 21" descr="A person wearing a mask&#10;&#10;Description automatically generated with low confidence">
+            <a:extLst>
+              <a:ext uri="{FF2B5EF4-FFF2-40B4-BE49-F238E27FC236}">
+                <a16:creationId xmlns:a16="http://schemas.microsoft.com/office/drawing/2014/main" id="{F79F722D-8FA2-4542-83CA-9BB142D2C4C1}"/>
+              </a:ext>
+            </a:extLst>
+          </p:cNvPr>
+          <p:cNvPicPr>
+            <a:picLocks noChangeAspect="1"/>
+          </p:cNvPicPr>
+          <p:nvPr/>
+        </p:nvPicPr>
+        <p:blipFill>
+          <a:blip r:embed="rId3"/>
+          <a:stretch>
+            <a:fillRect/>
+          </a:stretch>
+        </p:blipFill>
+        <p:spPr>
+          <a:xfrm>
+            <a:off x="4310825" y="2724965"/>
+            <a:ext cx="1581473" cy="1302610"/>
+          </a:xfrm>
+          <a:prstGeom prst="rect">
+            <a:avLst/>
+          </a:prstGeom>
+          <a:ln w="38100">
+            <a:solidFill>
+              <a:srgbClr val="FFFF00"/>
+            </a:solidFill>
+          </a:ln>
+        </p:spPr>
+      </p:pic>
+      <p:pic>
+        <p:nvPicPr>
+          <p:cNvPr id="23" name="Picture 22" descr="A person wearing a mask&#10;&#10;Description automatically generated with low confidence">
+            <a:extLst>
+              <a:ext uri="{FF2B5EF4-FFF2-40B4-BE49-F238E27FC236}">
+                <a16:creationId xmlns:a16="http://schemas.microsoft.com/office/drawing/2014/main" id="{F4798ED8-22AF-9743-87FD-AB71EC67D65A}"/>
+              </a:ext>
+            </a:extLst>
+          </p:cNvPr>
+          <p:cNvPicPr>
+            <a:picLocks noChangeAspect="1"/>
+          </p:cNvPicPr>
+          <p:nvPr/>
+        </p:nvPicPr>
+        <p:blipFill>
+          <a:blip r:embed="rId3"/>
+          <a:stretch>
+            <a:fillRect/>
+          </a:stretch>
+        </p:blipFill>
+        <p:spPr>
+          <a:xfrm>
+            <a:off x="5983183" y="2724965"/>
+            <a:ext cx="1581473" cy="1302610"/>
+          </a:xfrm>
+          <a:prstGeom prst="rect">
+            <a:avLst/>
+          </a:prstGeom>
+          <a:ln w="28575">
+            <a:noFill/>
+          </a:ln>
+        </p:spPr>
+      </p:pic>
+      <p:pic>
+        <p:nvPicPr>
+          <p:cNvPr id="24" name="Picture 23" descr="A person wearing a mask&#10;&#10;Description automatically generated with low confidence">
+            <a:extLst>
+              <a:ext uri="{FF2B5EF4-FFF2-40B4-BE49-F238E27FC236}">
+                <a16:creationId xmlns:a16="http://schemas.microsoft.com/office/drawing/2014/main" id="{487A609B-FC7D-D447-B383-C0B7BF72AEC7}"/>
+              </a:ext>
+            </a:extLst>
+          </p:cNvPr>
+          <p:cNvPicPr>
+            <a:picLocks noChangeAspect="1"/>
+          </p:cNvPicPr>
+          <p:nvPr/>
+        </p:nvPicPr>
+        <p:blipFill>
+          <a:blip r:embed="rId3"/>
+          <a:stretch>
+            <a:fillRect/>
+          </a:stretch>
+        </p:blipFill>
+        <p:spPr>
+          <a:xfrm>
+            <a:off x="7656556" y="2724965"/>
+            <a:ext cx="1581473" cy="1302610"/>
+          </a:xfrm>
+          <a:prstGeom prst="rect">
+            <a:avLst/>
+          </a:prstGeom>
+          <a:ln w="28575">
+            <a:noFill/>
+          </a:ln>
+        </p:spPr>
+      </p:pic>
+      <p:pic>
+        <p:nvPicPr>
+          <p:cNvPr id="4" name="Picture 3" descr="Shape&#10;&#10;Description automatically generated with medium confidence">
+            <a:extLst>
+              <a:ext uri="{FF2B5EF4-FFF2-40B4-BE49-F238E27FC236}">
+                <a16:creationId xmlns:a16="http://schemas.microsoft.com/office/drawing/2014/main" id="{9130E253-D811-6D46-9EBE-7FE86D6518B3}"/>
+              </a:ext>
+            </a:extLst>
+          </p:cNvPr>
+          <p:cNvPicPr>
+            <a:picLocks noChangeAspect="1"/>
+          </p:cNvPicPr>
+          <p:nvPr/>
+        </p:nvPicPr>
+        <p:blipFill>
+          <a:blip r:embed="rId5"/>
+          <a:stretch>
+            <a:fillRect/>
+          </a:stretch>
+        </p:blipFill>
+        <p:spPr>
+          <a:xfrm>
+            <a:off x="3691564" y="4854388"/>
+            <a:ext cx="4583237" cy="792387"/>
           </a:xfrm>
           <a:prstGeom prst="rect">
             <a:avLst/>
@@ -8855,6 +8966,36 @@
           <a:chExt cx="0" cy="0"/>
         </a:xfrm>
       </p:grpSpPr>
+      <p:pic>
+        <p:nvPicPr>
+          <p:cNvPr id="18" name="Picture 17" descr="Shape&#10;&#10;Description automatically generated with medium confidence">
+            <a:extLst>
+              <a:ext uri="{FF2B5EF4-FFF2-40B4-BE49-F238E27FC236}">
+                <a16:creationId xmlns:a16="http://schemas.microsoft.com/office/drawing/2014/main" id="{2A397BCC-4F29-0840-BDB5-09445A99C6C9}"/>
+              </a:ext>
+            </a:extLst>
+          </p:cNvPr>
+          <p:cNvPicPr>
+            <a:picLocks noChangeAspect="1"/>
+          </p:cNvPicPr>
+          <p:nvPr/>
+        </p:nvPicPr>
+        <p:blipFill>
+          <a:blip r:embed="rId3"/>
+          <a:stretch>
+            <a:fillRect/>
+          </a:stretch>
+        </p:blipFill>
+        <p:spPr>
+          <a:xfrm>
+            <a:off x="3268634" y="3111938"/>
+            <a:ext cx="5550051" cy="959537"/>
+          </a:xfrm>
+          <a:prstGeom prst="rect">
+            <a:avLst/>
+          </a:prstGeom>
+        </p:spPr>
+      </p:pic>
       <p:sp>
         <p:nvSpPr>
           <p:cNvPr id="15" name="Content Placeholder 2">
@@ -8888,7 +9029,7 @@
             </a:pPr>
             <a:r>
               <a:rPr lang="en-US" dirty="0"/>
-              <a:t>Use the LEFT Button to SELECT the person.</a:t>
+              <a:t>Use the LEFT Button to Accept the person.</a:t>
             </a:r>
           </a:p>
         </p:txBody>
@@ -9530,35 +9671,6 @@
           </p:txBody>
         </p:sp>
       </p:grpSp>
-      <p:pic>
-        <p:nvPicPr>
-          <p:cNvPr id="3" name="Picture 2" descr="Graphical user interface&#10;&#10;Description automatically generated">
-            <a:extLst>
-              <a:ext uri="{FF2B5EF4-FFF2-40B4-BE49-F238E27FC236}">
-                <a16:creationId xmlns:a16="http://schemas.microsoft.com/office/drawing/2014/main" id="{E7A38183-D78F-7044-B21A-BD06595C8291}"/>
-              </a:ext>
-            </a:extLst>
-          </p:cNvPr>
-          <p:cNvPicPr>
-            <a:picLocks noChangeAspect="1"/>
-          </p:cNvPicPr>
-          <p:nvPr/>
-        </p:nvPicPr>
-        <p:blipFill rotWithShape="1">
-          <a:blip r:embed="rId3"/>
-          <a:srcRect l="32463" t="60333" r="32861" b="30091"/>
-          <a:stretch/>
-        </p:blipFill>
-        <p:spPr>
-          <a:xfrm>
-            <a:off x="3588217" y="3105223"/>
-            <a:ext cx="5015565" cy="1032438"/>
-          </a:xfrm>
-          <a:prstGeom prst="rect">
-            <a:avLst/>
-          </a:prstGeom>
-        </p:spPr>
-      </p:pic>
       <p:cxnSp>
         <p:nvCxnSpPr>
           <p:cNvPr id="5" name="Straight Arrow Connector 4">
@@ -9618,8 +9730,8 @@
         </p:nvSpPr>
         <p:spPr>
           <a:xfrm>
-            <a:off x="5761102" y="4740531"/>
-            <a:ext cx="5317995" cy="584775"/>
+            <a:off x="4775162" y="4740531"/>
+            <a:ext cx="7289881" cy="584775"/>
           </a:xfrm>
           <a:prstGeom prst="rect">
             <a:avLst/>
@@ -9634,7 +9746,7 @@
             <a:pPr algn="ctr"/>
             <a:r>
               <a:rPr lang="en-US" sz="3200" dirty="0"/>
-              <a:t>Use the RIGHT Button to WAIT.</a:t>
+              <a:t>Use the RIGHT Button to Reject the person</a:t>
             </a:r>
           </a:p>
         </p:txBody>
@@ -9655,8 +9767,8 @@
         </p:nvCxnSpPr>
         <p:spPr>
           <a:xfrm flipH="1" flipV="1">
-            <a:off x="8166100" y="3953777"/>
-            <a:ext cx="254000" cy="786754"/>
+            <a:off x="8166105" y="3953777"/>
+            <a:ext cx="253998" cy="786754"/>
           </a:xfrm>
           <a:prstGeom prst="straightConnector1">
             <a:avLst/>
@@ -10398,10 +10510,10 @@
       </p:grpSp>
       <p:pic>
         <p:nvPicPr>
-          <p:cNvPr id="12" name="Picture 11" descr="Graphical user interface&#10;&#10;Description automatically generated">
+          <p:cNvPr id="18" name="Picture 17" descr="Graphical user interface, application&#10;&#10;Description automatically generated">
             <a:extLst>
               <a:ext uri="{FF2B5EF4-FFF2-40B4-BE49-F238E27FC236}">
-                <a16:creationId xmlns:a16="http://schemas.microsoft.com/office/drawing/2014/main" id="{4903AFA4-0FEF-4946-A7D5-28063984AE92}"/>
+                <a16:creationId xmlns:a16="http://schemas.microsoft.com/office/drawing/2014/main" id="{105A9570-5263-A547-8455-21A61F58D0DB}"/>
               </a:ext>
             </a:extLst>
           </p:cNvPr>
@@ -10412,13 +10524,13 @@
         </p:nvPicPr>
         <p:blipFill rotWithShape="1">
           <a:blip r:embed="rId3"/>
-          <a:srcRect l="8889" t="26039" r="8889" b="54353"/>
+          <a:srcRect l="13023" t="23939" r="12488" b="72186"/>
           <a:stretch/>
         </p:blipFill>
         <p:spPr>
           <a:xfrm>
-            <a:off x="1617214" y="3148410"/>
-            <a:ext cx="8957567" cy="1592355"/>
+            <a:off x="1584442" y="2415742"/>
+            <a:ext cx="9164073" cy="355309"/>
           </a:xfrm>
           <a:prstGeom prst="rect">
             <a:avLst/>
@@ -10427,10 +10539,10 @@
       </p:pic>
       <p:pic>
         <p:nvPicPr>
-          <p:cNvPr id="13" name="Picture 12" descr="Graphical user interface, application&#10;&#10;Description automatically generated">
+          <p:cNvPr id="20" name="Picture 19" descr="A person wearing a mask&#10;&#10;Description automatically generated with low confidence">
             <a:extLst>
               <a:ext uri="{FF2B5EF4-FFF2-40B4-BE49-F238E27FC236}">
-                <a16:creationId xmlns:a16="http://schemas.microsoft.com/office/drawing/2014/main" id="{51A21A05-12F2-694C-8F93-B94357CCA8F0}"/>
+                <a16:creationId xmlns:a16="http://schemas.microsoft.com/office/drawing/2014/main" id="{1ADEF108-01B0-9A4D-90C4-A7FF171CFB2C}"/>
               </a:ext>
             </a:extLst>
           </p:cNvPr>
@@ -10439,15 +10551,231 @@
           </p:cNvPicPr>
           <p:nvPr/>
         </p:nvPicPr>
-        <p:blipFill rotWithShape="1">
+        <p:blipFill>
           <a:blip r:embed="rId4"/>
-          <a:srcRect l="13023" t="23939" r="12488" b="72186"/>
-          <a:stretch/>
+          <a:stretch>
+            <a:fillRect/>
+          </a:stretch>
         </p:blipFill>
         <p:spPr>
           <a:xfrm>
-            <a:off x="2080079" y="2954041"/>
-            <a:ext cx="8104930" cy="314244"/>
+            <a:off x="1210813" y="2869928"/>
+            <a:ext cx="1178386" cy="970599"/>
+          </a:xfrm>
+          <a:prstGeom prst="rect">
+            <a:avLst/>
+          </a:prstGeom>
+          <a:ln w="38100">
+            <a:solidFill>
+              <a:srgbClr val="FFFF00"/>
+            </a:solidFill>
+          </a:ln>
+        </p:spPr>
+      </p:pic>
+      <p:pic>
+        <p:nvPicPr>
+          <p:cNvPr id="21" name="Picture 20" descr="A person wearing a mask&#10;&#10;Description automatically generated with low confidence">
+            <a:extLst>
+              <a:ext uri="{FF2B5EF4-FFF2-40B4-BE49-F238E27FC236}">
+                <a16:creationId xmlns:a16="http://schemas.microsoft.com/office/drawing/2014/main" id="{F30AF256-3B9A-F648-A204-7CA5E606EB4D}"/>
+              </a:ext>
+            </a:extLst>
+          </p:cNvPr>
+          <p:cNvPicPr>
+            <a:picLocks noChangeAspect="1"/>
+          </p:cNvPicPr>
+          <p:nvPr/>
+        </p:nvPicPr>
+        <p:blipFill>
+          <a:blip r:embed="rId4"/>
+          <a:stretch>
+            <a:fillRect/>
+          </a:stretch>
+        </p:blipFill>
+        <p:spPr>
+          <a:xfrm>
+            <a:off x="2442390" y="2869928"/>
+            <a:ext cx="1178386" cy="970599"/>
+          </a:xfrm>
+          <a:prstGeom prst="rect">
+            <a:avLst/>
+          </a:prstGeom>
+        </p:spPr>
+      </p:pic>
+      <p:pic>
+        <p:nvPicPr>
+          <p:cNvPr id="22" name="Picture 21" descr="A person wearing a mask&#10;&#10;Description automatically generated with low confidence">
+            <a:extLst>
+              <a:ext uri="{FF2B5EF4-FFF2-40B4-BE49-F238E27FC236}">
+                <a16:creationId xmlns:a16="http://schemas.microsoft.com/office/drawing/2014/main" id="{ECB238A3-71D7-594A-A08E-002E0FEA82BB}"/>
+              </a:ext>
+            </a:extLst>
+          </p:cNvPr>
+          <p:cNvPicPr>
+            <a:picLocks noChangeAspect="1"/>
+          </p:cNvPicPr>
+          <p:nvPr/>
+        </p:nvPicPr>
+        <p:blipFill>
+          <a:blip r:embed="rId4"/>
+          <a:stretch>
+            <a:fillRect/>
+          </a:stretch>
+        </p:blipFill>
+        <p:spPr>
+          <a:xfrm>
+            <a:off x="3673967" y="2869928"/>
+            <a:ext cx="1178386" cy="970599"/>
+          </a:xfrm>
+          <a:prstGeom prst="rect">
+            <a:avLst/>
+          </a:prstGeom>
+        </p:spPr>
+      </p:pic>
+      <p:pic>
+        <p:nvPicPr>
+          <p:cNvPr id="23" name="Picture 22" descr="A person wearing a mask&#10;&#10;Description automatically generated with low confidence">
+            <a:extLst>
+              <a:ext uri="{FF2B5EF4-FFF2-40B4-BE49-F238E27FC236}">
+                <a16:creationId xmlns:a16="http://schemas.microsoft.com/office/drawing/2014/main" id="{7637694B-AF36-9E4F-880F-D384E0790DA4}"/>
+              </a:ext>
+            </a:extLst>
+          </p:cNvPr>
+          <p:cNvPicPr>
+            <a:picLocks noChangeAspect="1"/>
+          </p:cNvPicPr>
+          <p:nvPr/>
+        </p:nvPicPr>
+        <p:blipFill>
+          <a:blip r:embed="rId4"/>
+          <a:stretch>
+            <a:fillRect/>
+          </a:stretch>
+        </p:blipFill>
+        <p:spPr>
+          <a:xfrm>
+            <a:off x="4920223" y="2869928"/>
+            <a:ext cx="1178386" cy="970599"/>
+          </a:xfrm>
+          <a:prstGeom prst="rect">
+            <a:avLst/>
+          </a:prstGeom>
+        </p:spPr>
+      </p:pic>
+      <p:pic>
+        <p:nvPicPr>
+          <p:cNvPr id="24" name="Picture 23" descr="A person wearing a mask&#10;&#10;Description automatically generated with low confidence">
+            <a:extLst>
+              <a:ext uri="{FF2B5EF4-FFF2-40B4-BE49-F238E27FC236}">
+                <a16:creationId xmlns:a16="http://schemas.microsoft.com/office/drawing/2014/main" id="{723E14BA-C8F8-B449-B364-8346662380B3}"/>
+              </a:ext>
+            </a:extLst>
+          </p:cNvPr>
+          <p:cNvPicPr>
+            <a:picLocks noChangeAspect="1"/>
+          </p:cNvPicPr>
+          <p:nvPr/>
+        </p:nvPicPr>
+        <p:blipFill>
+          <a:blip r:embed="rId4"/>
+          <a:stretch>
+            <a:fillRect/>
+          </a:stretch>
+        </p:blipFill>
+        <p:spPr>
+          <a:xfrm>
+            <a:off x="6166479" y="2869928"/>
+            <a:ext cx="1178386" cy="970599"/>
+          </a:xfrm>
+          <a:prstGeom prst="rect">
+            <a:avLst/>
+          </a:prstGeom>
+        </p:spPr>
+      </p:pic>
+      <p:pic>
+        <p:nvPicPr>
+          <p:cNvPr id="25" name="Picture 24" descr="A person wearing a mask&#10;&#10;Description automatically generated with low confidence">
+            <a:extLst>
+              <a:ext uri="{FF2B5EF4-FFF2-40B4-BE49-F238E27FC236}">
+                <a16:creationId xmlns:a16="http://schemas.microsoft.com/office/drawing/2014/main" id="{0B579B0B-06C0-1848-B884-082C1FBBA8BF}"/>
+              </a:ext>
+            </a:extLst>
+          </p:cNvPr>
+          <p:cNvPicPr>
+            <a:picLocks noChangeAspect="1"/>
+          </p:cNvPicPr>
+          <p:nvPr/>
+        </p:nvPicPr>
+        <p:blipFill>
+          <a:blip r:embed="rId4"/>
+          <a:stretch>
+            <a:fillRect/>
+          </a:stretch>
+        </p:blipFill>
+        <p:spPr>
+          <a:xfrm>
+            <a:off x="7398056" y="2869928"/>
+            <a:ext cx="1178386" cy="970599"/>
+          </a:xfrm>
+          <a:prstGeom prst="rect">
+            <a:avLst/>
+          </a:prstGeom>
+        </p:spPr>
+      </p:pic>
+      <p:pic>
+        <p:nvPicPr>
+          <p:cNvPr id="26" name="Picture 25" descr="A person wearing a mask&#10;&#10;Description automatically generated with low confidence">
+            <a:extLst>
+              <a:ext uri="{FF2B5EF4-FFF2-40B4-BE49-F238E27FC236}">
+                <a16:creationId xmlns:a16="http://schemas.microsoft.com/office/drawing/2014/main" id="{0F017283-A824-5B40-AC26-1E11E1BDC233}"/>
+              </a:ext>
+            </a:extLst>
+          </p:cNvPr>
+          <p:cNvPicPr>
+            <a:picLocks noChangeAspect="1"/>
+          </p:cNvPicPr>
+          <p:nvPr/>
+        </p:nvPicPr>
+        <p:blipFill>
+          <a:blip r:embed="rId4"/>
+          <a:stretch>
+            <a:fillRect/>
+          </a:stretch>
+        </p:blipFill>
+        <p:spPr>
+          <a:xfrm>
+            <a:off x="8629633" y="2869928"/>
+            <a:ext cx="1178386" cy="970599"/>
+          </a:xfrm>
+          <a:prstGeom prst="rect">
+            <a:avLst/>
+          </a:prstGeom>
+        </p:spPr>
+      </p:pic>
+      <p:pic>
+        <p:nvPicPr>
+          <p:cNvPr id="27" name="Picture 26" descr="A person wearing a mask&#10;&#10;Description automatically generated with low confidence">
+            <a:extLst>
+              <a:ext uri="{FF2B5EF4-FFF2-40B4-BE49-F238E27FC236}">
+                <a16:creationId xmlns:a16="http://schemas.microsoft.com/office/drawing/2014/main" id="{C70335BD-2C37-E348-A8AD-8E0EBBDDAFF9}"/>
+              </a:ext>
+            </a:extLst>
+          </p:cNvPr>
+          <p:cNvPicPr>
+            <a:picLocks noChangeAspect="1"/>
+          </p:cNvPicPr>
+          <p:nvPr/>
+        </p:nvPicPr>
+        <p:blipFill>
+          <a:blip r:embed="rId4"/>
+          <a:stretch>
+            <a:fillRect/>
+          </a:stretch>
+        </p:blipFill>
+        <p:spPr>
+          <a:xfrm>
+            <a:off x="9875888" y="2869928"/>
+            <a:ext cx="1178386" cy="970599"/>
           </a:xfrm>
           <a:prstGeom prst="rect">
             <a:avLst/>
@@ -11167,12 +11495,64 @@
           </p:txBody>
         </p:sp>
       </p:grpSp>
+      <p:sp>
+        <p:nvSpPr>
+          <p:cNvPr id="20" name="Rectangle 19">
+            <a:extLst>
+              <a:ext uri="{FF2B5EF4-FFF2-40B4-BE49-F238E27FC236}">
+                <a16:creationId xmlns:a16="http://schemas.microsoft.com/office/drawing/2014/main" id="{63A87501-986E-3B48-8AF0-A4F434FBEF90}"/>
+              </a:ext>
+            </a:extLst>
+          </p:cNvPr>
+          <p:cNvSpPr/>
+          <p:nvPr/>
+        </p:nvSpPr>
+        <p:spPr>
+          <a:xfrm>
+            <a:off x="7672815" y="3346812"/>
+            <a:ext cx="351046" cy="276498"/>
+          </a:xfrm>
+          <a:prstGeom prst="rect">
+            <a:avLst/>
+          </a:prstGeom>
+          <a:solidFill>
+            <a:schemeClr val="bg1"/>
+          </a:solidFill>
+          <a:ln>
+            <a:noFill/>
+          </a:ln>
+        </p:spPr>
+        <p:style>
+          <a:lnRef idx="2">
+            <a:schemeClr val="accent1">
+              <a:shade val="50000"/>
+            </a:schemeClr>
+          </a:lnRef>
+          <a:fillRef idx="1">
+            <a:schemeClr val="accent1"/>
+          </a:fillRef>
+          <a:effectRef idx="0">
+            <a:schemeClr val="accent1"/>
+          </a:effectRef>
+          <a:fontRef idx="minor">
+            <a:schemeClr val="lt1"/>
+          </a:fontRef>
+        </p:style>
+        <p:txBody>
+          <a:bodyPr rtlCol="0" anchor="ctr"/>
+          <a:lstStyle/>
+          <a:p>
+            <a:pPr algn="ctr"/>
+            <a:endParaRPr lang="en-US"/>
+          </a:p>
+        </p:txBody>
+      </p:sp>
       <p:pic>
         <p:nvPicPr>
-          <p:cNvPr id="18" name="Picture 17" descr="Graphical user interface&#10;&#10;Description automatically generated">
+          <p:cNvPr id="21" name="Picture 20" descr="Graphical user interface, application&#10;&#10;Description automatically generated">
             <a:extLst>
               <a:ext uri="{FF2B5EF4-FFF2-40B4-BE49-F238E27FC236}">
-                <a16:creationId xmlns:a16="http://schemas.microsoft.com/office/drawing/2014/main" id="{34598B07-6DB7-3C41-94AA-02A3FA513767}"/>
+                <a16:creationId xmlns:a16="http://schemas.microsoft.com/office/drawing/2014/main" id="{9FD4F716-80DF-A84B-9395-C5040BAF99E4}"/>
               </a:ext>
             </a:extLst>
           </p:cNvPr>
@@ -11183,13 +11563,13 @@
         </p:nvPicPr>
         <p:blipFill rotWithShape="1">
           <a:blip r:embed="rId3"/>
-          <a:srcRect l="8889" t="26039" r="8889" b="54353"/>
+          <a:srcRect l="13023" t="23939" r="12488" b="72186"/>
           <a:stretch/>
         </p:blipFill>
         <p:spPr>
           <a:xfrm>
-            <a:off x="1617214" y="3148410"/>
-            <a:ext cx="8957567" cy="1592355"/>
+            <a:off x="1584442" y="2415742"/>
+            <a:ext cx="9164073" cy="355309"/>
           </a:xfrm>
           <a:prstGeom prst="rect">
             <a:avLst/>
@@ -11198,10 +11578,10 @@
       </p:pic>
       <p:pic>
         <p:nvPicPr>
-          <p:cNvPr id="3" name="Picture 2" descr="Graphical user interface, website&#10;&#10;Description automatically generated">
+          <p:cNvPr id="22" name="Picture 21" descr="A person wearing a mask&#10;&#10;Description automatically generated with low confidence">
             <a:extLst>
               <a:ext uri="{FF2B5EF4-FFF2-40B4-BE49-F238E27FC236}">
-                <a16:creationId xmlns:a16="http://schemas.microsoft.com/office/drawing/2014/main" id="{AEE2A1CA-E268-7247-B1A0-73A256FD4CC4}"/>
+                <a16:creationId xmlns:a16="http://schemas.microsoft.com/office/drawing/2014/main" id="{96FFDCB1-C52F-B64F-9F6B-F19246345FFC}"/>
               </a:ext>
             </a:extLst>
           </p:cNvPr>
@@ -11210,15 +11590,84 @@
           </p:cNvPicPr>
           <p:nvPr/>
         </p:nvPicPr>
-        <p:blipFill rotWithShape="1">
+        <p:blipFill>
           <a:blip r:embed="rId4"/>
-          <a:srcRect l="8889" t="27222" r="8889" b="57256"/>
-          <a:stretch/>
+          <a:stretch>
+            <a:fillRect/>
+          </a:stretch>
         </p:blipFill>
         <p:spPr>
           <a:xfrm>
-            <a:off x="1617214" y="3256860"/>
-            <a:ext cx="8976935" cy="1263274"/>
+            <a:off x="1210813" y="2869928"/>
+            <a:ext cx="1178386" cy="970599"/>
+          </a:xfrm>
+          <a:prstGeom prst="rect">
+            <a:avLst/>
+          </a:prstGeom>
+          <a:ln w="38100">
+            <a:noFill/>
+          </a:ln>
+        </p:spPr>
+      </p:pic>
+      <p:pic>
+        <p:nvPicPr>
+          <p:cNvPr id="23" name="Picture 22" descr="A person wearing a mask&#10;&#10;Description automatically generated with low confidence">
+            <a:extLst>
+              <a:ext uri="{FF2B5EF4-FFF2-40B4-BE49-F238E27FC236}">
+                <a16:creationId xmlns:a16="http://schemas.microsoft.com/office/drawing/2014/main" id="{CFAD1B64-5828-2B4E-98EB-1206031A9645}"/>
+              </a:ext>
+            </a:extLst>
+          </p:cNvPr>
+          <p:cNvPicPr>
+            <a:picLocks noChangeAspect="1"/>
+          </p:cNvPicPr>
+          <p:nvPr/>
+        </p:nvPicPr>
+        <p:blipFill>
+          <a:blip r:embed="rId4"/>
+          <a:stretch>
+            <a:fillRect/>
+          </a:stretch>
+        </p:blipFill>
+        <p:spPr>
+          <a:xfrm>
+            <a:off x="2442390" y="2869928"/>
+            <a:ext cx="1178386" cy="970599"/>
+          </a:xfrm>
+          <a:prstGeom prst="rect">
+            <a:avLst/>
+          </a:prstGeom>
+          <a:ln w="38100">
+            <a:solidFill>
+              <a:srgbClr val="FFFF00"/>
+            </a:solidFill>
+          </a:ln>
+        </p:spPr>
+      </p:pic>
+      <p:pic>
+        <p:nvPicPr>
+          <p:cNvPr id="24" name="Picture 23" descr="A person wearing a mask&#10;&#10;Description automatically generated with low confidence">
+            <a:extLst>
+              <a:ext uri="{FF2B5EF4-FFF2-40B4-BE49-F238E27FC236}">
+                <a16:creationId xmlns:a16="http://schemas.microsoft.com/office/drawing/2014/main" id="{BE98A6CD-4145-8F4A-B3AC-DE6AE70BCFD6}"/>
+              </a:ext>
+            </a:extLst>
+          </p:cNvPr>
+          <p:cNvPicPr>
+            <a:picLocks noChangeAspect="1"/>
+          </p:cNvPicPr>
+          <p:nvPr/>
+        </p:nvPicPr>
+        <p:blipFill>
+          <a:blip r:embed="rId4"/>
+          <a:stretch>
+            <a:fillRect/>
+          </a:stretch>
+        </p:blipFill>
+        <p:spPr>
+          <a:xfrm>
+            <a:off x="3673967" y="2869928"/>
+            <a:ext cx="1178386" cy="970599"/>
           </a:xfrm>
           <a:prstGeom prst="rect">
             <a:avLst/>
@@ -11227,10 +11676,10 @@
       </p:pic>
       <p:pic>
         <p:nvPicPr>
-          <p:cNvPr id="19" name="Picture 18" descr="Graphical user interface, application&#10;&#10;Description automatically generated">
+          <p:cNvPr id="25" name="Picture 24" descr="A person wearing a mask&#10;&#10;Description automatically generated with low confidence">
             <a:extLst>
               <a:ext uri="{FF2B5EF4-FFF2-40B4-BE49-F238E27FC236}">
-                <a16:creationId xmlns:a16="http://schemas.microsoft.com/office/drawing/2014/main" id="{BFD06DE0-8DE4-4F44-AB49-D2688FF9CF39}"/>
+                <a16:creationId xmlns:a16="http://schemas.microsoft.com/office/drawing/2014/main" id="{870D4F24-4E6C-6B44-9FAC-01E97A334F5F}"/>
               </a:ext>
             </a:extLst>
           </p:cNvPr>
@@ -11239,15 +11688,136 @@
           </p:cNvPicPr>
           <p:nvPr/>
         </p:nvPicPr>
-        <p:blipFill rotWithShape="1">
-          <a:blip r:embed="rId5"/>
-          <a:srcRect l="13023" t="23939" r="12488" b="72186"/>
-          <a:stretch/>
+        <p:blipFill>
+          <a:blip r:embed="rId4"/>
+          <a:stretch>
+            <a:fillRect/>
+          </a:stretch>
         </p:blipFill>
         <p:spPr>
           <a:xfrm>
-            <a:off x="2080079" y="2954041"/>
-            <a:ext cx="8104930" cy="314244"/>
+            <a:off x="4920223" y="2869928"/>
+            <a:ext cx="1178386" cy="970599"/>
+          </a:xfrm>
+          <a:prstGeom prst="rect">
+            <a:avLst/>
+          </a:prstGeom>
+        </p:spPr>
+      </p:pic>
+      <p:pic>
+        <p:nvPicPr>
+          <p:cNvPr id="26" name="Picture 25" descr="A person wearing a mask&#10;&#10;Description automatically generated with low confidence">
+            <a:extLst>
+              <a:ext uri="{FF2B5EF4-FFF2-40B4-BE49-F238E27FC236}">
+                <a16:creationId xmlns:a16="http://schemas.microsoft.com/office/drawing/2014/main" id="{2B118AFE-7714-3D40-A925-0478C4A74A1D}"/>
+              </a:ext>
+            </a:extLst>
+          </p:cNvPr>
+          <p:cNvPicPr>
+            <a:picLocks noChangeAspect="1"/>
+          </p:cNvPicPr>
+          <p:nvPr/>
+        </p:nvPicPr>
+        <p:blipFill>
+          <a:blip r:embed="rId4"/>
+          <a:stretch>
+            <a:fillRect/>
+          </a:stretch>
+        </p:blipFill>
+        <p:spPr>
+          <a:xfrm>
+            <a:off x="6166479" y="2869928"/>
+            <a:ext cx="1178386" cy="970599"/>
+          </a:xfrm>
+          <a:prstGeom prst="rect">
+            <a:avLst/>
+          </a:prstGeom>
+        </p:spPr>
+      </p:pic>
+      <p:pic>
+        <p:nvPicPr>
+          <p:cNvPr id="27" name="Picture 26" descr="A person wearing a mask&#10;&#10;Description automatically generated with low confidence">
+            <a:extLst>
+              <a:ext uri="{FF2B5EF4-FFF2-40B4-BE49-F238E27FC236}">
+                <a16:creationId xmlns:a16="http://schemas.microsoft.com/office/drawing/2014/main" id="{6E15BDC7-6BDB-F444-9312-1BD80845C1C3}"/>
+              </a:ext>
+            </a:extLst>
+          </p:cNvPr>
+          <p:cNvPicPr>
+            <a:picLocks noChangeAspect="1"/>
+          </p:cNvPicPr>
+          <p:nvPr/>
+        </p:nvPicPr>
+        <p:blipFill>
+          <a:blip r:embed="rId4"/>
+          <a:stretch>
+            <a:fillRect/>
+          </a:stretch>
+        </p:blipFill>
+        <p:spPr>
+          <a:xfrm>
+            <a:off x="7398056" y="2869928"/>
+            <a:ext cx="1178386" cy="970599"/>
+          </a:xfrm>
+          <a:prstGeom prst="rect">
+            <a:avLst/>
+          </a:prstGeom>
+        </p:spPr>
+      </p:pic>
+      <p:pic>
+        <p:nvPicPr>
+          <p:cNvPr id="28" name="Picture 27" descr="A person wearing a mask&#10;&#10;Description automatically generated with low confidence">
+            <a:extLst>
+              <a:ext uri="{FF2B5EF4-FFF2-40B4-BE49-F238E27FC236}">
+                <a16:creationId xmlns:a16="http://schemas.microsoft.com/office/drawing/2014/main" id="{7645CA23-4FEC-9B41-A76A-263DD0B98693}"/>
+              </a:ext>
+            </a:extLst>
+          </p:cNvPr>
+          <p:cNvPicPr>
+            <a:picLocks noChangeAspect="1"/>
+          </p:cNvPicPr>
+          <p:nvPr/>
+        </p:nvPicPr>
+        <p:blipFill>
+          <a:blip r:embed="rId4"/>
+          <a:stretch>
+            <a:fillRect/>
+          </a:stretch>
+        </p:blipFill>
+        <p:spPr>
+          <a:xfrm>
+            <a:off x="8629633" y="2869928"/>
+            <a:ext cx="1178386" cy="970599"/>
+          </a:xfrm>
+          <a:prstGeom prst="rect">
+            <a:avLst/>
+          </a:prstGeom>
+        </p:spPr>
+      </p:pic>
+      <p:pic>
+        <p:nvPicPr>
+          <p:cNvPr id="29" name="Picture 28" descr="A person wearing a mask&#10;&#10;Description automatically generated with low confidence">
+            <a:extLst>
+              <a:ext uri="{FF2B5EF4-FFF2-40B4-BE49-F238E27FC236}">
+                <a16:creationId xmlns:a16="http://schemas.microsoft.com/office/drawing/2014/main" id="{CED18112-6A5E-4144-9213-DDC4969FBAE6}"/>
+              </a:ext>
+            </a:extLst>
+          </p:cNvPr>
+          <p:cNvPicPr>
+            <a:picLocks noChangeAspect="1"/>
+          </p:cNvPicPr>
+          <p:nvPr/>
+        </p:nvPicPr>
+        <p:blipFill>
+          <a:blip r:embed="rId4"/>
+          <a:stretch>
+            <a:fillRect/>
+          </a:stretch>
+        </p:blipFill>
+        <p:spPr>
+          <a:xfrm>
+            <a:off x="9875888" y="2869928"/>
+            <a:ext cx="1178386" cy="970599"/>
           </a:xfrm>
           <a:prstGeom prst="rect">
             <a:avLst/>
@@ -11967,12 +12537,64 @@
           </p:txBody>
         </p:sp>
       </p:grpSp>
+      <p:sp>
+        <p:nvSpPr>
+          <p:cNvPr id="19" name="Rectangle 18">
+            <a:extLst>
+              <a:ext uri="{FF2B5EF4-FFF2-40B4-BE49-F238E27FC236}">
+                <a16:creationId xmlns:a16="http://schemas.microsoft.com/office/drawing/2014/main" id="{A7B18681-E69F-4E46-B5C2-E6E500F52C76}"/>
+              </a:ext>
+            </a:extLst>
+          </p:cNvPr>
+          <p:cNvSpPr/>
+          <p:nvPr/>
+        </p:nvSpPr>
+        <p:spPr>
+          <a:xfrm>
+            <a:off x="7672815" y="3346812"/>
+            <a:ext cx="351046" cy="276498"/>
+          </a:xfrm>
+          <a:prstGeom prst="rect">
+            <a:avLst/>
+          </a:prstGeom>
+          <a:solidFill>
+            <a:schemeClr val="bg1"/>
+          </a:solidFill>
+          <a:ln>
+            <a:noFill/>
+          </a:ln>
+        </p:spPr>
+        <p:style>
+          <a:lnRef idx="2">
+            <a:schemeClr val="accent1">
+              <a:shade val="50000"/>
+            </a:schemeClr>
+          </a:lnRef>
+          <a:fillRef idx="1">
+            <a:schemeClr val="accent1"/>
+          </a:fillRef>
+          <a:effectRef idx="0">
+            <a:schemeClr val="accent1"/>
+          </a:effectRef>
+          <a:fontRef idx="minor">
+            <a:schemeClr val="lt1"/>
+          </a:fontRef>
+        </p:style>
+        <p:txBody>
+          <a:bodyPr rtlCol="0" anchor="ctr"/>
+          <a:lstStyle/>
+          <a:p>
+            <a:pPr algn="ctr"/>
+            <a:endParaRPr lang="en-US"/>
+          </a:p>
+        </p:txBody>
+      </p:sp>
       <p:pic>
         <p:nvPicPr>
-          <p:cNvPr id="13" name="Picture 12" descr="Graphical user interface, website&#10;&#10;Description automatically generated">
+          <p:cNvPr id="20" name="Picture 19" descr="Graphical user interface, application&#10;&#10;Description automatically generated">
             <a:extLst>
               <a:ext uri="{FF2B5EF4-FFF2-40B4-BE49-F238E27FC236}">
-                <a16:creationId xmlns:a16="http://schemas.microsoft.com/office/drawing/2014/main" id="{3B870575-5C98-DA4B-8010-989119A51F3C}"/>
+                <a16:creationId xmlns:a16="http://schemas.microsoft.com/office/drawing/2014/main" id="{9A10456E-1240-7846-B58E-6E3EBDD25013}"/>
               </a:ext>
             </a:extLst>
           </p:cNvPr>
@@ -11983,13 +12605,13 @@
         </p:nvPicPr>
         <p:blipFill rotWithShape="1">
           <a:blip r:embed="rId3"/>
-          <a:srcRect l="8889" t="27222" r="8889" b="57256"/>
+          <a:srcRect l="13023" t="23939" r="12488" b="72186"/>
           <a:stretch/>
         </p:blipFill>
         <p:spPr>
           <a:xfrm>
-            <a:off x="1617214" y="3256860"/>
-            <a:ext cx="8976935" cy="1263274"/>
+            <a:off x="1584442" y="2415742"/>
+            <a:ext cx="9164073" cy="355309"/>
           </a:xfrm>
           <a:prstGeom prst="rect">
             <a:avLst/>
@@ -11998,10 +12620,10 @@
       </p:pic>
       <p:pic>
         <p:nvPicPr>
-          <p:cNvPr id="3" name="Picture 2" descr="Graphical user interface&#10;&#10;Description automatically generated">
+          <p:cNvPr id="21" name="Picture 20" descr="A person wearing a mask&#10;&#10;Description automatically generated with low confidence">
             <a:extLst>
               <a:ext uri="{FF2B5EF4-FFF2-40B4-BE49-F238E27FC236}">
-                <a16:creationId xmlns:a16="http://schemas.microsoft.com/office/drawing/2014/main" id="{6FC5B391-AA68-6A43-8B26-BB752ACC0C31}"/>
+                <a16:creationId xmlns:a16="http://schemas.microsoft.com/office/drawing/2014/main" id="{364D8075-FCF4-3048-9D4A-EFA2717BE14A}"/>
               </a:ext>
             </a:extLst>
           </p:cNvPr>
@@ -12010,15 +12632,49 @@
           </p:cNvPicPr>
           <p:nvPr/>
         </p:nvPicPr>
-        <p:blipFill rotWithShape="1">
+        <p:blipFill>
           <a:blip r:embed="rId4"/>
-          <a:srcRect l="8889" t="27408" r="8889" b="57384"/>
-          <a:stretch/>
+          <a:stretch>
+            <a:fillRect/>
+          </a:stretch>
         </p:blipFill>
         <p:spPr>
           <a:xfrm>
-            <a:off x="1597851" y="3213736"/>
-            <a:ext cx="8976935" cy="1237742"/>
+            <a:off x="1210813" y="2869928"/>
+            <a:ext cx="1178386" cy="970599"/>
+          </a:xfrm>
+          <a:prstGeom prst="rect">
+            <a:avLst/>
+          </a:prstGeom>
+          <a:ln w="38100">
+            <a:noFill/>
+          </a:ln>
+        </p:spPr>
+      </p:pic>
+      <p:pic>
+        <p:nvPicPr>
+          <p:cNvPr id="22" name="Picture 21" descr="A person wearing a mask&#10;&#10;Description automatically generated with low confidence">
+            <a:extLst>
+              <a:ext uri="{FF2B5EF4-FFF2-40B4-BE49-F238E27FC236}">
+                <a16:creationId xmlns:a16="http://schemas.microsoft.com/office/drawing/2014/main" id="{E1392EE1-0FC3-944B-824A-A3A7228FFEE4}"/>
+              </a:ext>
+            </a:extLst>
+          </p:cNvPr>
+          <p:cNvPicPr>
+            <a:picLocks noChangeAspect="1"/>
+          </p:cNvPicPr>
+          <p:nvPr/>
+        </p:nvPicPr>
+        <p:blipFill>
+          <a:blip r:embed="rId4"/>
+          <a:stretch>
+            <a:fillRect/>
+          </a:stretch>
+        </p:blipFill>
+        <p:spPr>
+          <a:xfrm>
+            <a:off x="2442390" y="2869928"/>
+            <a:ext cx="1178386" cy="970599"/>
           </a:xfrm>
           <a:prstGeom prst="rect">
             <a:avLst/>
@@ -12027,10 +12683,10 @@
       </p:pic>
       <p:pic>
         <p:nvPicPr>
-          <p:cNvPr id="18" name="Picture 17" descr="Graphical user interface, application&#10;&#10;Description automatically generated">
+          <p:cNvPr id="23" name="Picture 22" descr="A person wearing a mask&#10;&#10;Description automatically generated with low confidence">
             <a:extLst>
               <a:ext uri="{FF2B5EF4-FFF2-40B4-BE49-F238E27FC236}">
-                <a16:creationId xmlns:a16="http://schemas.microsoft.com/office/drawing/2014/main" id="{41C8F57B-D093-814D-A0E2-4DFDABEE1A7E}"/>
+                <a16:creationId xmlns:a16="http://schemas.microsoft.com/office/drawing/2014/main" id="{20BDDABC-F8A7-0843-A712-DF49E8C60318}"/>
               </a:ext>
             </a:extLst>
           </p:cNvPr>
@@ -12039,15 +12695,171 @@
           </p:cNvPicPr>
           <p:nvPr/>
         </p:nvPicPr>
-        <p:blipFill rotWithShape="1">
-          <a:blip r:embed="rId5"/>
-          <a:srcRect l="13023" t="23939" r="12488" b="72186"/>
-          <a:stretch/>
+        <p:blipFill>
+          <a:blip r:embed="rId4"/>
+          <a:stretch>
+            <a:fillRect/>
+          </a:stretch>
         </p:blipFill>
         <p:spPr>
           <a:xfrm>
-            <a:off x="2080079" y="2954041"/>
-            <a:ext cx="8104930" cy="314244"/>
+            <a:off x="3673967" y="2869928"/>
+            <a:ext cx="1178386" cy="970599"/>
+          </a:xfrm>
+          <a:prstGeom prst="rect">
+            <a:avLst/>
+          </a:prstGeom>
+          <a:ln w="38100">
+            <a:solidFill>
+              <a:srgbClr val="FFFF00"/>
+            </a:solidFill>
+          </a:ln>
+        </p:spPr>
+      </p:pic>
+      <p:pic>
+        <p:nvPicPr>
+          <p:cNvPr id="24" name="Picture 23" descr="A person wearing a mask&#10;&#10;Description automatically generated with low confidence">
+            <a:extLst>
+              <a:ext uri="{FF2B5EF4-FFF2-40B4-BE49-F238E27FC236}">
+                <a16:creationId xmlns:a16="http://schemas.microsoft.com/office/drawing/2014/main" id="{5155A17C-C385-334D-99E6-9454E9878157}"/>
+              </a:ext>
+            </a:extLst>
+          </p:cNvPr>
+          <p:cNvPicPr>
+            <a:picLocks noChangeAspect="1"/>
+          </p:cNvPicPr>
+          <p:nvPr/>
+        </p:nvPicPr>
+        <p:blipFill>
+          <a:blip r:embed="rId4"/>
+          <a:stretch>
+            <a:fillRect/>
+          </a:stretch>
+        </p:blipFill>
+        <p:spPr>
+          <a:xfrm>
+            <a:off x="4920223" y="2869928"/>
+            <a:ext cx="1178386" cy="970599"/>
+          </a:xfrm>
+          <a:prstGeom prst="rect">
+            <a:avLst/>
+          </a:prstGeom>
+        </p:spPr>
+      </p:pic>
+      <p:pic>
+        <p:nvPicPr>
+          <p:cNvPr id="25" name="Picture 24" descr="A person wearing a mask&#10;&#10;Description automatically generated with low confidence">
+            <a:extLst>
+              <a:ext uri="{FF2B5EF4-FFF2-40B4-BE49-F238E27FC236}">
+                <a16:creationId xmlns:a16="http://schemas.microsoft.com/office/drawing/2014/main" id="{8E31D291-A8F4-5D4D-91F1-B5D2B71DD934}"/>
+              </a:ext>
+            </a:extLst>
+          </p:cNvPr>
+          <p:cNvPicPr>
+            <a:picLocks noChangeAspect="1"/>
+          </p:cNvPicPr>
+          <p:nvPr/>
+        </p:nvPicPr>
+        <p:blipFill>
+          <a:blip r:embed="rId4"/>
+          <a:stretch>
+            <a:fillRect/>
+          </a:stretch>
+        </p:blipFill>
+        <p:spPr>
+          <a:xfrm>
+            <a:off x="6166479" y="2869928"/>
+            <a:ext cx="1178386" cy="970599"/>
+          </a:xfrm>
+          <a:prstGeom prst="rect">
+            <a:avLst/>
+          </a:prstGeom>
+        </p:spPr>
+      </p:pic>
+      <p:pic>
+        <p:nvPicPr>
+          <p:cNvPr id="26" name="Picture 25" descr="A person wearing a mask&#10;&#10;Description automatically generated with low confidence">
+            <a:extLst>
+              <a:ext uri="{FF2B5EF4-FFF2-40B4-BE49-F238E27FC236}">
+                <a16:creationId xmlns:a16="http://schemas.microsoft.com/office/drawing/2014/main" id="{E806EDDA-2D2C-4B4D-BDE8-2535EA3FBA2F}"/>
+              </a:ext>
+            </a:extLst>
+          </p:cNvPr>
+          <p:cNvPicPr>
+            <a:picLocks noChangeAspect="1"/>
+          </p:cNvPicPr>
+          <p:nvPr/>
+        </p:nvPicPr>
+        <p:blipFill>
+          <a:blip r:embed="rId4"/>
+          <a:stretch>
+            <a:fillRect/>
+          </a:stretch>
+        </p:blipFill>
+        <p:spPr>
+          <a:xfrm>
+            <a:off x="7398056" y="2869928"/>
+            <a:ext cx="1178386" cy="970599"/>
+          </a:xfrm>
+          <a:prstGeom prst="rect">
+            <a:avLst/>
+          </a:prstGeom>
+        </p:spPr>
+      </p:pic>
+      <p:pic>
+        <p:nvPicPr>
+          <p:cNvPr id="27" name="Picture 26" descr="A person wearing a mask&#10;&#10;Description automatically generated with low confidence">
+            <a:extLst>
+              <a:ext uri="{FF2B5EF4-FFF2-40B4-BE49-F238E27FC236}">
+                <a16:creationId xmlns:a16="http://schemas.microsoft.com/office/drawing/2014/main" id="{A7E3C954-9726-BE40-B8DD-C8434C26B208}"/>
+              </a:ext>
+            </a:extLst>
+          </p:cNvPr>
+          <p:cNvPicPr>
+            <a:picLocks noChangeAspect="1"/>
+          </p:cNvPicPr>
+          <p:nvPr/>
+        </p:nvPicPr>
+        <p:blipFill>
+          <a:blip r:embed="rId4"/>
+          <a:stretch>
+            <a:fillRect/>
+          </a:stretch>
+        </p:blipFill>
+        <p:spPr>
+          <a:xfrm>
+            <a:off x="8629633" y="2869928"/>
+            <a:ext cx="1178386" cy="970599"/>
+          </a:xfrm>
+          <a:prstGeom prst="rect">
+            <a:avLst/>
+          </a:prstGeom>
+        </p:spPr>
+      </p:pic>
+      <p:pic>
+        <p:nvPicPr>
+          <p:cNvPr id="28" name="Picture 27" descr="A person wearing a mask&#10;&#10;Description automatically generated with low confidence">
+            <a:extLst>
+              <a:ext uri="{FF2B5EF4-FFF2-40B4-BE49-F238E27FC236}">
+                <a16:creationId xmlns:a16="http://schemas.microsoft.com/office/drawing/2014/main" id="{E8B0EE03-D7E6-BB46-B395-49290EE838B6}"/>
+              </a:ext>
+            </a:extLst>
+          </p:cNvPr>
+          <p:cNvPicPr>
+            <a:picLocks noChangeAspect="1"/>
+          </p:cNvPicPr>
+          <p:nvPr/>
+        </p:nvPicPr>
+        <p:blipFill>
+          <a:blip r:embed="rId4"/>
+          <a:stretch>
+            <a:fillRect/>
+          </a:stretch>
+        </p:blipFill>
+        <p:spPr>
+          <a:xfrm>
+            <a:off x="9875888" y="2869928"/>
+            <a:ext cx="1178386" cy="970599"/>
           </a:xfrm>
           <a:prstGeom prst="rect">
             <a:avLst/>
@@ -19917,6 +20729,35 @@
           </p:spPr>
         </p:pic>
       </p:grpSp>
+      <p:pic>
+        <p:nvPicPr>
+          <p:cNvPr id="17" name="Picture 16" descr="Graphical user interface, application&#10;&#10;Description automatically generated">
+            <a:extLst>
+              <a:ext uri="{FF2B5EF4-FFF2-40B4-BE49-F238E27FC236}">
+                <a16:creationId xmlns:a16="http://schemas.microsoft.com/office/drawing/2014/main" id="{678DF59D-B65C-5549-806F-F623031D7FB0}"/>
+              </a:ext>
+            </a:extLst>
+          </p:cNvPr>
+          <p:cNvPicPr>
+            <a:picLocks noChangeAspect="1"/>
+          </p:cNvPicPr>
+          <p:nvPr/>
+        </p:nvPicPr>
+        <p:blipFill rotWithShape="1">
+          <a:blip r:embed="rId4"/>
+          <a:srcRect l="13023" t="23939" r="47940" b="72593"/>
+          <a:stretch/>
+        </p:blipFill>
+        <p:spPr>
+          <a:xfrm>
+            <a:off x="4059381" y="3014171"/>
+            <a:ext cx="4682838" cy="310059"/>
+          </a:xfrm>
+          <a:prstGeom prst="rect">
+            <a:avLst/>
+          </a:prstGeom>
+        </p:spPr>
+      </p:pic>
     </p:spTree>
     <p:extLst>
       <p:ext uri="{BB962C8B-B14F-4D97-AF65-F5344CB8AC3E}">
@@ -20578,12 +21419,41 @@
           </p:txBody>
         </p:sp>
       </p:grpSp>
+      <p:pic>
+        <p:nvPicPr>
+          <p:cNvPr id="22" name="Picture 21" descr="Graphical user interface, application&#10;&#10;Description automatically generated">
+            <a:extLst>
+              <a:ext uri="{FF2B5EF4-FFF2-40B4-BE49-F238E27FC236}">
+                <a16:creationId xmlns:a16="http://schemas.microsoft.com/office/drawing/2014/main" id="{9A45A9EB-B954-6043-9E3E-64A9759F303E}"/>
+              </a:ext>
+            </a:extLst>
+          </p:cNvPr>
+          <p:cNvPicPr>
+            <a:picLocks noChangeAspect="1"/>
+          </p:cNvPicPr>
+          <p:nvPr/>
+        </p:nvPicPr>
+        <p:blipFill rotWithShape="1">
+          <a:blip r:embed="rId3"/>
+          <a:srcRect l="13023" t="23939" r="12488" b="72186"/>
+          <a:stretch/>
+        </p:blipFill>
+        <p:spPr>
+          <a:xfrm>
+            <a:off x="1584442" y="2415742"/>
+            <a:ext cx="9164073" cy="355309"/>
+          </a:xfrm>
+          <a:prstGeom prst="rect">
+            <a:avLst/>
+          </a:prstGeom>
+        </p:spPr>
+      </p:pic>
       <p:grpSp>
         <p:nvGrpSpPr>
-          <p:cNvPr id="2" name="Group 1">
+          <p:cNvPr id="23" name="Group 22">
             <a:extLst>
               <a:ext uri="{FF2B5EF4-FFF2-40B4-BE49-F238E27FC236}">
-                <a16:creationId xmlns:a16="http://schemas.microsoft.com/office/drawing/2014/main" id="{0641F8A9-1068-BC4D-9A11-D8C3DE6BEB53}"/>
+                <a16:creationId xmlns:a16="http://schemas.microsoft.com/office/drawing/2014/main" id="{7D44C72E-4819-DF4E-ABE7-09E4840150F9}"/>
               </a:ext>
             </a:extLst>
           </p:cNvPr>
@@ -20592,7 +21462,7 @@
         </p:nvGrpSpPr>
         <p:grpSpPr>
           <a:xfrm>
-            <a:off x="1174269" y="3043959"/>
+            <a:off x="1210813" y="2869928"/>
             <a:ext cx="9843461" cy="970599"/>
             <a:chOff x="315379" y="2955191"/>
             <a:chExt cx="12482053" cy="1230773"/>
@@ -20600,10 +21470,10 @@
         </p:grpSpPr>
         <p:pic>
           <p:nvPicPr>
-            <p:cNvPr id="13" name="Picture 12" descr="A person wearing a mask&#10;&#10;Description automatically generated with low confidence">
+            <p:cNvPr id="25" name="Picture 24" descr="A person wearing a mask&#10;&#10;Description automatically generated with low confidence">
               <a:extLst>
                 <a:ext uri="{FF2B5EF4-FFF2-40B4-BE49-F238E27FC236}">
-                  <a16:creationId xmlns:a16="http://schemas.microsoft.com/office/drawing/2014/main" id="{B8156BD0-FF24-B346-A14E-18077689C91C}"/>
+                  <a16:creationId xmlns:a16="http://schemas.microsoft.com/office/drawing/2014/main" id="{3BCA1886-C8DD-3347-B06F-92BA182D6E2B}"/>
                 </a:ext>
               </a:extLst>
             </p:cNvPr>
@@ -20613,7 +21483,7 @@
             <p:nvPr/>
           </p:nvPicPr>
           <p:blipFill>
-            <a:blip r:embed="rId3"/>
+            <a:blip r:embed="rId4"/>
             <a:stretch>
               <a:fillRect/>
             </a:stretch>
@@ -20630,10 +21500,10 @@
         </p:pic>
         <p:pic>
           <p:nvPicPr>
-            <p:cNvPr id="16" name="Picture 15" descr="A person wearing a mask&#10;&#10;Description automatically generated with low confidence">
+            <p:cNvPr id="29" name="Picture 28" descr="A person wearing a mask&#10;&#10;Description automatically generated with low confidence">
               <a:extLst>
                 <a:ext uri="{FF2B5EF4-FFF2-40B4-BE49-F238E27FC236}">
-                  <a16:creationId xmlns:a16="http://schemas.microsoft.com/office/drawing/2014/main" id="{CF19374D-609F-E243-8776-852F67083855}"/>
+                  <a16:creationId xmlns:a16="http://schemas.microsoft.com/office/drawing/2014/main" id="{E7A2E906-28AD-864E-861C-AB8EBCA06C68}"/>
                 </a:ext>
               </a:extLst>
             </p:cNvPr>
@@ -20643,7 +21513,7 @@
             <p:nvPr/>
           </p:nvPicPr>
           <p:blipFill>
-            <a:blip r:embed="rId3"/>
+            <a:blip r:embed="rId4"/>
             <a:stretch>
               <a:fillRect/>
             </a:stretch>
@@ -20660,10 +21530,10 @@
         </p:pic>
         <p:pic>
           <p:nvPicPr>
-            <p:cNvPr id="20" name="Picture 19" descr="A person wearing a mask&#10;&#10;Description automatically generated with low confidence">
+            <p:cNvPr id="30" name="Picture 29" descr="A person wearing a mask&#10;&#10;Description automatically generated with low confidence">
               <a:extLst>
                 <a:ext uri="{FF2B5EF4-FFF2-40B4-BE49-F238E27FC236}">
-                  <a16:creationId xmlns:a16="http://schemas.microsoft.com/office/drawing/2014/main" id="{149DC621-EEDB-4D4E-B963-D1886E498022}"/>
+                  <a16:creationId xmlns:a16="http://schemas.microsoft.com/office/drawing/2014/main" id="{A0B3AB70-6557-CA41-9722-202906C15970}"/>
                 </a:ext>
               </a:extLst>
             </p:cNvPr>
@@ -20673,7 +21543,7 @@
             <p:nvPr/>
           </p:nvPicPr>
           <p:blipFill>
-            <a:blip r:embed="rId3"/>
+            <a:blip r:embed="rId4"/>
             <a:stretch>
               <a:fillRect/>
             </a:stretch>
@@ -20690,10 +21560,10 @@
         </p:pic>
         <p:pic>
           <p:nvPicPr>
-            <p:cNvPr id="21" name="Picture 20" descr="A person wearing a mask&#10;&#10;Description automatically generated with low confidence">
+            <p:cNvPr id="31" name="Picture 30" descr="A person wearing a mask&#10;&#10;Description automatically generated with low confidence">
               <a:extLst>
                 <a:ext uri="{FF2B5EF4-FFF2-40B4-BE49-F238E27FC236}">
-                  <a16:creationId xmlns:a16="http://schemas.microsoft.com/office/drawing/2014/main" id="{66BC36A4-00D2-224F-96A4-DA09169D4F86}"/>
+                  <a16:creationId xmlns:a16="http://schemas.microsoft.com/office/drawing/2014/main" id="{9D733D0A-F378-4D4B-B0D4-3AC68192998F}"/>
                 </a:ext>
               </a:extLst>
             </p:cNvPr>
@@ -20703,7 +21573,7 @@
             <p:nvPr/>
           </p:nvPicPr>
           <p:blipFill>
-            <a:blip r:embed="rId3"/>
+            <a:blip r:embed="rId4"/>
             <a:stretch>
               <a:fillRect/>
             </a:stretch>
@@ -20720,10 +21590,10 @@
         </p:pic>
         <p:pic>
           <p:nvPicPr>
-            <p:cNvPr id="24" name="Picture 23" descr="A person wearing a mask&#10;&#10;Description automatically generated with low confidence">
+            <p:cNvPr id="32" name="Picture 31" descr="A person wearing a mask&#10;&#10;Description automatically generated with low confidence">
               <a:extLst>
                 <a:ext uri="{FF2B5EF4-FFF2-40B4-BE49-F238E27FC236}">
-                  <a16:creationId xmlns:a16="http://schemas.microsoft.com/office/drawing/2014/main" id="{CACA5DD5-1BEB-B941-ACEE-D229C6CC1FC8}"/>
+                  <a16:creationId xmlns:a16="http://schemas.microsoft.com/office/drawing/2014/main" id="{6D525B0A-967D-5447-BEAF-3B0D3F3989BA}"/>
                 </a:ext>
               </a:extLst>
             </p:cNvPr>
@@ -20733,7 +21603,7 @@
             <p:nvPr/>
           </p:nvPicPr>
           <p:blipFill>
-            <a:blip r:embed="rId3"/>
+            <a:blip r:embed="rId4"/>
             <a:stretch>
               <a:fillRect/>
             </a:stretch>
@@ -20750,10 +21620,10 @@
         </p:pic>
         <p:pic>
           <p:nvPicPr>
-            <p:cNvPr id="26" name="Picture 25" descr="A person wearing a mask&#10;&#10;Description automatically generated with low confidence">
+            <p:cNvPr id="33" name="Picture 32" descr="A person wearing a mask&#10;&#10;Description automatically generated with low confidence">
               <a:extLst>
                 <a:ext uri="{FF2B5EF4-FFF2-40B4-BE49-F238E27FC236}">
-                  <a16:creationId xmlns:a16="http://schemas.microsoft.com/office/drawing/2014/main" id="{9CD35228-D182-4148-9C39-127C95030C46}"/>
+                  <a16:creationId xmlns:a16="http://schemas.microsoft.com/office/drawing/2014/main" id="{EF115985-283C-D549-879F-CD5DB2458BDF}"/>
                 </a:ext>
               </a:extLst>
             </p:cNvPr>
@@ -20763,7 +21633,7 @@
             <p:nvPr/>
           </p:nvPicPr>
           <p:blipFill>
-            <a:blip r:embed="rId3"/>
+            <a:blip r:embed="rId4"/>
             <a:stretch>
               <a:fillRect/>
             </a:stretch>
@@ -20780,10 +21650,10 @@
         </p:pic>
         <p:pic>
           <p:nvPicPr>
-            <p:cNvPr id="27" name="Picture 26" descr="A person wearing a mask&#10;&#10;Description automatically generated with low confidence">
+            <p:cNvPr id="34" name="Picture 33" descr="A person wearing a mask&#10;&#10;Description automatically generated with low confidence">
               <a:extLst>
                 <a:ext uri="{FF2B5EF4-FFF2-40B4-BE49-F238E27FC236}">
-                  <a16:creationId xmlns:a16="http://schemas.microsoft.com/office/drawing/2014/main" id="{AC0A0E79-988C-EB4D-957D-A251E4B84326}"/>
+                  <a16:creationId xmlns:a16="http://schemas.microsoft.com/office/drawing/2014/main" id="{5DBDBC09-4F45-2E48-B36F-08FCFA0F844D}"/>
                 </a:ext>
               </a:extLst>
             </p:cNvPr>
@@ -20793,7 +21663,7 @@
             <p:nvPr/>
           </p:nvPicPr>
           <p:blipFill>
-            <a:blip r:embed="rId3"/>
+            <a:blip r:embed="rId4"/>
             <a:stretch>
               <a:fillRect/>
             </a:stretch>
@@ -20810,10 +21680,10 @@
         </p:pic>
         <p:pic>
           <p:nvPicPr>
-            <p:cNvPr id="28" name="Picture 27" descr="A person wearing a mask&#10;&#10;Description automatically generated with low confidence">
+            <p:cNvPr id="35" name="Picture 34" descr="A person wearing a mask&#10;&#10;Description automatically generated with low confidence">
               <a:extLst>
                 <a:ext uri="{FF2B5EF4-FFF2-40B4-BE49-F238E27FC236}">
-                  <a16:creationId xmlns:a16="http://schemas.microsoft.com/office/drawing/2014/main" id="{5937BF69-7433-FD40-991F-A12C0465DD3F}"/>
+                  <a16:creationId xmlns:a16="http://schemas.microsoft.com/office/drawing/2014/main" id="{34B81F3D-0302-4C48-B86A-208D76763BE7}"/>
                 </a:ext>
               </a:extLst>
             </p:cNvPr>
@@ -20823,7 +21693,7 @@
             <p:nvPr/>
           </p:nvPicPr>
           <p:blipFill>
-            <a:blip r:embed="rId3"/>
+            <a:blip r:embed="rId4"/>
             <a:stretch>
               <a:fillRect/>
             </a:stretch>
@@ -20929,7 +21799,7 @@
         </p:nvSpPr>
         <p:spPr>
           <a:xfrm>
-            <a:off x="3992880" y="5256766"/>
+            <a:off x="3992880" y="5201237"/>
             <a:ext cx="4206240" cy="973959"/>
           </a:xfrm>
           <a:prstGeom prst="rect">
@@ -20983,58 +21853,6 @@
           <a:xfrm>
             <a:off x="7672815" y="3522659"/>
             <a:ext cx="351046" cy="276498"/>
-          </a:xfrm>
-          <a:prstGeom prst="rect">
-            <a:avLst/>
-          </a:prstGeom>
-          <a:solidFill>
-            <a:schemeClr val="bg1"/>
-          </a:solidFill>
-          <a:ln>
-            <a:noFill/>
-          </a:ln>
-        </p:spPr>
-        <p:style>
-          <a:lnRef idx="2">
-            <a:schemeClr val="accent1">
-              <a:shade val="50000"/>
-            </a:schemeClr>
-          </a:lnRef>
-          <a:fillRef idx="1">
-            <a:schemeClr val="accent1"/>
-          </a:fillRef>
-          <a:effectRef idx="0">
-            <a:schemeClr val="accent1"/>
-          </a:effectRef>
-          <a:fontRef idx="minor">
-            <a:schemeClr val="lt1"/>
-          </a:fontRef>
-        </p:style>
-        <p:txBody>
-          <a:bodyPr rtlCol="0" anchor="ctr"/>
-          <a:lstStyle/>
-          <a:p>
-            <a:pPr algn="ctr"/>
-            <a:endParaRPr lang="en-US"/>
-          </a:p>
-        </p:txBody>
-      </p:sp>
-      <p:sp>
-        <p:nvSpPr>
-          <p:cNvPr id="9" name="Rectangle 8">
-            <a:extLst>
-              <a:ext uri="{FF2B5EF4-FFF2-40B4-BE49-F238E27FC236}">
-                <a16:creationId xmlns:a16="http://schemas.microsoft.com/office/drawing/2014/main" id="{327EB9F4-3524-9D41-8A59-5EB3FA91976E}"/>
-              </a:ext>
-            </a:extLst>
-          </p:cNvPr>
-          <p:cNvSpPr/>
-          <p:nvPr/>
-        </p:nvSpPr>
-        <p:spPr>
-          <a:xfrm>
-            <a:off x="840890" y="3063925"/>
-            <a:ext cx="4206240" cy="973959"/>
           </a:xfrm>
           <a:prstGeom prst="rect">
             <a:avLst/>
@@ -21656,35 +22474,6 @@
           </p:txBody>
         </p:sp>
       </p:grpSp>
-      <p:pic>
-        <p:nvPicPr>
-          <p:cNvPr id="24" name="Picture 23" descr="Graphical user interface&#10;&#10;Description automatically generated">
-            <a:extLst>
-              <a:ext uri="{FF2B5EF4-FFF2-40B4-BE49-F238E27FC236}">
-                <a16:creationId xmlns:a16="http://schemas.microsoft.com/office/drawing/2014/main" id="{01DE0E0F-8E4D-C949-B115-D4F5A4B49972}"/>
-              </a:ext>
-            </a:extLst>
-          </p:cNvPr>
-          <p:cNvPicPr>
-            <a:picLocks noChangeAspect="1"/>
-          </p:cNvPicPr>
-          <p:nvPr/>
-        </p:nvPicPr>
-        <p:blipFill rotWithShape="1">
-          <a:blip r:embed="rId3"/>
-          <a:srcRect l="8889" t="26039" r="8889" b="54353"/>
-          <a:stretch/>
-        </p:blipFill>
-        <p:spPr>
-          <a:xfrm>
-            <a:off x="1617216" y="2528495"/>
-            <a:ext cx="8957567" cy="1592355"/>
-          </a:xfrm>
-          <a:prstGeom prst="rect">
-            <a:avLst/>
-          </a:prstGeom>
-        </p:spPr>
-      </p:pic>
       <p:sp>
         <p:nvSpPr>
           <p:cNvPr id="26" name="TextBox 25">
@@ -21738,14 +22527,259 @@
           <p:nvPr/>
         </p:nvPicPr>
         <p:blipFill rotWithShape="1">
-          <a:blip r:embed="rId4"/>
+          <a:blip r:embed="rId3"/>
           <a:srcRect l="13023" t="23939" r="12488" b="72186"/>
           <a:stretch/>
         </p:blipFill>
         <p:spPr>
           <a:xfrm>
-            <a:off x="2080079" y="2349125"/>
-            <a:ext cx="8104930" cy="314244"/>
+            <a:off x="1584442" y="2415742"/>
+            <a:ext cx="9164073" cy="355309"/>
+          </a:xfrm>
+          <a:prstGeom prst="rect">
+            <a:avLst/>
+          </a:prstGeom>
+        </p:spPr>
+      </p:pic>
+      <p:pic>
+        <p:nvPicPr>
+          <p:cNvPr id="25" name="Picture 24" descr="A person wearing a mask&#10;&#10;Description automatically generated with low confidence">
+            <a:extLst>
+              <a:ext uri="{FF2B5EF4-FFF2-40B4-BE49-F238E27FC236}">
+                <a16:creationId xmlns:a16="http://schemas.microsoft.com/office/drawing/2014/main" id="{AD1A7681-6E0B-1F46-98CD-D014FE29C2B5}"/>
+              </a:ext>
+            </a:extLst>
+          </p:cNvPr>
+          <p:cNvPicPr>
+            <a:picLocks noChangeAspect="1"/>
+          </p:cNvPicPr>
+          <p:nvPr/>
+        </p:nvPicPr>
+        <p:blipFill>
+          <a:blip r:embed="rId4"/>
+          <a:stretch>
+            <a:fillRect/>
+          </a:stretch>
+        </p:blipFill>
+        <p:spPr>
+          <a:xfrm>
+            <a:off x="1210813" y="2869928"/>
+            <a:ext cx="1178386" cy="970599"/>
+          </a:xfrm>
+          <a:prstGeom prst="rect">
+            <a:avLst/>
+          </a:prstGeom>
+          <a:ln w="38100">
+            <a:solidFill>
+              <a:srgbClr val="FFFF66"/>
+            </a:solidFill>
+          </a:ln>
+        </p:spPr>
+      </p:pic>
+      <p:pic>
+        <p:nvPicPr>
+          <p:cNvPr id="28" name="Picture 27" descr="A person wearing a mask&#10;&#10;Description automatically generated with low confidence">
+            <a:extLst>
+              <a:ext uri="{FF2B5EF4-FFF2-40B4-BE49-F238E27FC236}">
+                <a16:creationId xmlns:a16="http://schemas.microsoft.com/office/drawing/2014/main" id="{A7AE0E6E-72C7-3B46-B80E-FDB9A3084736}"/>
+              </a:ext>
+            </a:extLst>
+          </p:cNvPr>
+          <p:cNvPicPr>
+            <a:picLocks noChangeAspect="1"/>
+          </p:cNvPicPr>
+          <p:nvPr/>
+        </p:nvPicPr>
+        <p:blipFill>
+          <a:blip r:embed="rId4"/>
+          <a:stretch>
+            <a:fillRect/>
+          </a:stretch>
+        </p:blipFill>
+        <p:spPr>
+          <a:xfrm>
+            <a:off x="2442390" y="2869928"/>
+            <a:ext cx="1178386" cy="970599"/>
+          </a:xfrm>
+          <a:prstGeom prst="rect">
+            <a:avLst/>
+          </a:prstGeom>
+        </p:spPr>
+      </p:pic>
+      <p:pic>
+        <p:nvPicPr>
+          <p:cNvPr id="29" name="Picture 28" descr="A person wearing a mask&#10;&#10;Description automatically generated with low confidence">
+            <a:extLst>
+              <a:ext uri="{FF2B5EF4-FFF2-40B4-BE49-F238E27FC236}">
+                <a16:creationId xmlns:a16="http://schemas.microsoft.com/office/drawing/2014/main" id="{F7AA9326-4CF8-FD47-8800-5EDBD52C5A2C}"/>
+              </a:ext>
+            </a:extLst>
+          </p:cNvPr>
+          <p:cNvPicPr>
+            <a:picLocks noChangeAspect="1"/>
+          </p:cNvPicPr>
+          <p:nvPr/>
+        </p:nvPicPr>
+        <p:blipFill>
+          <a:blip r:embed="rId4"/>
+          <a:stretch>
+            <a:fillRect/>
+          </a:stretch>
+        </p:blipFill>
+        <p:spPr>
+          <a:xfrm>
+            <a:off x="3673967" y="2869928"/>
+            <a:ext cx="1178386" cy="970599"/>
+          </a:xfrm>
+          <a:prstGeom prst="rect">
+            <a:avLst/>
+          </a:prstGeom>
+        </p:spPr>
+      </p:pic>
+      <p:pic>
+        <p:nvPicPr>
+          <p:cNvPr id="30" name="Picture 29" descr="A person wearing a mask&#10;&#10;Description automatically generated with low confidence">
+            <a:extLst>
+              <a:ext uri="{FF2B5EF4-FFF2-40B4-BE49-F238E27FC236}">
+                <a16:creationId xmlns:a16="http://schemas.microsoft.com/office/drawing/2014/main" id="{4044AF2A-BFA6-E844-9886-B8FC146FC999}"/>
+              </a:ext>
+            </a:extLst>
+          </p:cNvPr>
+          <p:cNvPicPr>
+            <a:picLocks noChangeAspect="1"/>
+          </p:cNvPicPr>
+          <p:nvPr/>
+        </p:nvPicPr>
+        <p:blipFill>
+          <a:blip r:embed="rId4"/>
+          <a:stretch>
+            <a:fillRect/>
+          </a:stretch>
+        </p:blipFill>
+        <p:spPr>
+          <a:xfrm>
+            <a:off x="4920223" y="2869928"/>
+            <a:ext cx="1178386" cy="970599"/>
+          </a:xfrm>
+          <a:prstGeom prst="rect">
+            <a:avLst/>
+          </a:prstGeom>
+        </p:spPr>
+      </p:pic>
+      <p:pic>
+        <p:nvPicPr>
+          <p:cNvPr id="31" name="Picture 30" descr="A person wearing a mask&#10;&#10;Description automatically generated with low confidence">
+            <a:extLst>
+              <a:ext uri="{FF2B5EF4-FFF2-40B4-BE49-F238E27FC236}">
+                <a16:creationId xmlns:a16="http://schemas.microsoft.com/office/drawing/2014/main" id="{656D0330-6CF2-6A4D-9552-AADC0FA9975A}"/>
+              </a:ext>
+            </a:extLst>
+          </p:cNvPr>
+          <p:cNvPicPr>
+            <a:picLocks noChangeAspect="1"/>
+          </p:cNvPicPr>
+          <p:nvPr/>
+        </p:nvPicPr>
+        <p:blipFill>
+          <a:blip r:embed="rId4"/>
+          <a:stretch>
+            <a:fillRect/>
+          </a:stretch>
+        </p:blipFill>
+        <p:spPr>
+          <a:xfrm>
+            <a:off x="6166479" y="2869928"/>
+            <a:ext cx="1178386" cy="970599"/>
+          </a:xfrm>
+          <a:prstGeom prst="rect">
+            <a:avLst/>
+          </a:prstGeom>
+        </p:spPr>
+      </p:pic>
+      <p:pic>
+        <p:nvPicPr>
+          <p:cNvPr id="32" name="Picture 31" descr="A person wearing a mask&#10;&#10;Description automatically generated with low confidence">
+            <a:extLst>
+              <a:ext uri="{FF2B5EF4-FFF2-40B4-BE49-F238E27FC236}">
+                <a16:creationId xmlns:a16="http://schemas.microsoft.com/office/drawing/2014/main" id="{C53222DE-8355-4A40-AF3F-F147D1B32745}"/>
+              </a:ext>
+            </a:extLst>
+          </p:cNvPr>
+          <p:cNvPicPr>
+            <a:picLocks noChangeAspect="1"/>
+          </p:cNvPicPr>
+          <p:nvPr/>
+        </p:nvPicPr>
+        <p:blipFill>
+          <a:blip r:embed="rId4"/>
+          <a:stretch>
+            <a:fillRect/>
+          </a:stretch>
+        </p:blipFill>
+        <p:spPr>
+          <a:xfrm>
+            <a:off x="7398056" y="2869928"/>
+            <a:ext cx="1178386" cy="970599"/>
+          </a:xfrm>
+          <a:prstGeom prst="rect">
+            <a:avLst/>
+          </a:prstGeom>
+        </p:spPr>
+      </p:pic>
+      <p:pic>
+        <p:nvPicPr>
+          <p:cNvPr id="33" name="Picture 32" descr="A person wearing a mask&#10;&#10;Description automatically generated with low confidence">
+            <a:extLst>
+              <a:ext uri="{FF2B5EF4-FFF2-40B4-BE49-F238E27FC236}">
+                <a16:creationId xmlns:a16="http://schemas.microsoft.com/office/drawing/2014/main" id="{541B2B48-82EF-4C4C-9C19-91E8FA604F95}"/>
+              </a:ext>
+            </a:extLst>
+          </p:cNvPr>
+          <p:cNvPicPr>
+            <a:picLocks noChangeAspect="1"/>
+          </p:cNvPicPr>
+          <p:nvPr/>
+        </p:nvPicPr>
+        <p:blipFill>
+          <a:blip r:embed="rId4"/>
+          <a:stretch>
+            <a:fillRect/>
+          </a:stretch>
+        </p:blipFill>
+        <p:spPr>
+          <a:xfrm>
+            <a:off x="8629633" y="2869928"/>
+            <a:ext cx="1178386" cy="970599"/>
+          </a:xfrm>
+          <a:prstGeom prst="rect">
+            <a:avLst/>
+          </a:prstGeom>
+        </p:spPr>
+      </p:pic>
+      <p:pic>
+        <p:nvPicPr>
+          <p:cNvPr id="34" name="Picture 33" descr="A person wearing a mask&#10;&#10;Description automatically generated with low confidence">
+            <a:extLst>
+              <a:ext uri="{FF2B5EF4-FFF2-40B4-BE49-F238E27FC236}">
+                <a16:creationId xmlns:a16="http://schemas.microsoft.com/office/drawing/2014/main" id="{A6AFE625-7A0B-5945-A183-0B695670203B}"/>
+              </a:ext>
+            </a:extLst>
+          </p:cNvPr>
+          <p:cNvPicPr>
+            <a:picLocks noChangeAspect="1"/>
+          </p:cNvPicPr>
+          <p:nvPr/>
+        </p:nvPicPr>
+        <p:blipFill>
+          <a:blip r:embed="rId4"/>
+          <a:stretch>
+            <a:fillRect/>
+          </a:stretch>
+        </p:blipFill>
+        <p:spPr>
+          <a:xfrm>
+            <a:off x="9875888" y="2869928"/>
+            <a:ext cx="1178386" cy="970599"/>
           </a:xfrm>
           <a:prstGeom prst="rect">
             <a:avLst/>
@@ -22621,35 +23655,6 @@
           </a:p>
         </p:txBody>
       </p:sp>
-      <p:pic>
-        <p:nvPicPr>
-          <p:cNvPr id="29" name="Picture 28" descr="Graphical user interface&#10;&#10;Description automatically generated">
-            <a:extLst>
-              <a:ext uri="{FF2B5EF4-FFF2-40B4-BE49-F238E27FC236}">
-                <a16:creationId xmlns:a16="http://schemas.microsoft.com/office/drawing/2014/main" id="{74E8DE2F-935C-9648-95F4-6B5B6A67E802}"/>
-              </a:ext>
-            </a:extLst>
-          </p:cNvPr>
-          <p:cNvPicPr>
-            <a:picLocks noChangeAspect="1"/>
-          </p:cNvPicPr>
-          <p:nvPr/>
-        </p:nvPicPr>
-        <p:blipFill rotWithShape="1">
-          <a:blip r:embed="rId3"/>
-          <a:srcRect l="8889" t="26039" r="8889" b="54353"/>
-          <a:stretch/>
-        </p:blipFill>
-        <p:spPr>
-          <a:xfrm>
-            <a:off x="1617216" y="2528495"/>
-            <a:ext cx="8957567" cy="1592355"/>
-          </a:xfrm>
-          <a:prstGeom prst="rect">
-            <a:avLst/>
-          </a:prstGeom>
-        </p:spPr>
-      </p:pic>
       <p:sp>
         <p:nvSpPr>
           <p:cNvPr id="30" name="TextBox 29">
@@ -22690,10 +23695,10 @@
       </p:sp>
       <p:pic>
         <p:nvPicPr>
-          <p:cNvPr id="31" name="Picture 30" descr="Graphical user interface, application&#10;&#10;Description automatically generated">
+          <p:cNvPr id="23" name="Picture 22" descr="Graphical user interface, application&#10;&#10;Description automatically generated">
             <a:extLst>
               <a:ext uri="{FF2B5EF4-FFF2-40B4-BE49-F238E27FC236}">
-                <a16:creationId xmlns:a16="http://schemas.microsoft.com/office/drawing/2014/main" id="{1350565D-769D-814A-B83A-9B36928D897A}"/>
+                <a16:creationId xmlns:a16="http://schemas.microsoft.com/office/drawing/2014/main" id="{27B3BBCA-AB75-3546-B2DA-B10FFCCF33CB}"/>
               </a:ext>
             </a:extLst>
           </p:cNvPr>
@@ -22703,14 +23708,259 @@
           <p:nvPr/>
         </p:nvPicPr>
         <p:blipFill rotWithShape="1">
-          <a:blip r:embed="rId4"/>
+          <a:blip r:embed="rId3"/>
           <a:srcRect l="13023" t="23939" r="12488" b="72186"/>
           <a:stretch/>
         </p:blipFill>
         <p:spPr>
           <a:xfrm>
-            <a:off x="2080079" y="2349125"/>
-            <a:ext cx="8104930" cy="314244"/>
+            <a:off x="1584442" y="2415742"/>
+            <a:ext cx="9164073" cy="355309"/>
+          </a:xfrm>
+          <a:prstGeom prst="rect">
+            <a:avLst/>
+          </a:prstGeom>
+        </p:spPr>
+      </p:pic>
+      <p:pic>
+        <p:nvPicPr>
+          <p:cNvPr id="25" name="Picture 24" descr="A person wearing a mask&#10;&#10;Description automatically generated with low confidence">
+            <a:extLst>
+              <a:ext uri="{FF2B5EF4-FFF2-40B4-BE49-F238E27FC236}">
+                <a16:creationId xmlns:a16="http://schemas.microsoft.com/office/drawing/2014/main" id="{914628C9-29A3-824D-98B2-F992030920D4}"/>
+              </a:ext>
+            </a:extLst>
+          </p:cNvPr>
+          <p:cNvPicPr>
+            <a:picLocks noChangeAspect="1"/>
+          </p:cNvPicPr>
+          <p:nvPr/>
+        </p:nvPicPr>
+        <p:blipFill>
+          <a:blip r:embed="rId4"/>
+          <a:stretch>
+            <a:fillRect/>
+          </a:stretch>
+        </p:blipFill>
+        <p:spPr>
+          <a:xfrm>
+            <a:off x="1210813" y="2869928"/>
+            <a:ext cx="1178386" cy="970599"/>
+          </a:xfrm>
+          <a:prstGeom prst="rect">
+            <a:avLst/>
+          </a:prstGeom>
+          <a:ln w="38100">
+            <a:solidFill>
+              <a:srgbClr val="FFFF66"/>
+            </a:solidFill>
+          </a:ln>
+        </p:spPr>
+      </p:pic>
+      <p:pic>
+        <p:nvPicPr>
+          <p:cNvPr id="26" name="Picture 25" descr="A person wearing a mask&#10;&#10;Description automatically generated with low confidence">
+            <a:extLst>
+              <a:ext uri="{FF2B5EF4-FFF2-40B4-BE49-F238E27FC236}">
+                <a16:creationId xmlns:a16="http://schemas.microsoft.com/office/drawing/2014/main" id="{7C6235FF-4354-934D-A4F0-3B14EEEDE7FA}"/>
+              </a:ext>
+            </a:extLst>
+          </p:cNvPr>
+          <p:cNvPicPr>
+            <a:picLocks noChangeAspect="1"/>
+          </p:cNvPicPr>
+          <p:nvPr/>
+        </p:nvPicPr>
+        <p:blipFill>
+          <a:blip r:embed="rId4"/>
+          <a:stretch>
+            <a:fillRect/>
+          </a:stretch>
+        </p:blipFill>
+        <p:spPr>
+          <a:xfrm>
+            <a:off x="2442390" y="2869928"/>
+            <a:ext cx="1178386" cy="970599"/>
+          </a:xfrm>
+          <a:prstGeom prst="rect">
+            <a:avLst/>
+          </a:prstGeom>
+        </p:spPr>
+      </p:pic>
+      <p:pic>
+        <p:nvPicPr>
+          <p:cNvPr id="27" name="Picture 26" descr="A person wearing a mask&#10;&#10;Description automatically generated with low confidence">
+            <a:extLst>
+              <a:ext uri="{FF2B5EF4-FFF2-40B4-BE49-F238E27FC236}">
+                <a16:creationId xmlns:a16="http://schemas.microsoft.com/office/drawing/2014/main" id="{EEAEE498-43BD-B64B-94AC-1650177823D9}"/>
+              </a:ext>
+            </a:extLst>
+          </p:cNvPr>
+          <p:cNvPicPr>
+            <a:picLocks noChangeAspect="1"/>
+          </p:cNvPicPr>
+          <p:nvPr/>
+        </p:nvPicPr>
+        <p:blipFill>
+          <a:blip r:embed="rId4"/>
+          <a:stretch>
+            <a:fillRect/>
+          </a:stretch>
+        </p:blipFill>
+        <p:spPr>
+          <a:xfrm>
+            <a:off x="3673967" y="2869928"/>
+            <a:ext cx="1178386" cy="970599"/>
+          </a:xfrm>
+          <a:prstGeom prst="rect">
+            <a:avLst/>
+          </a:prstGeom>
+        </p:spPr>
+      </p:pic>
+      <p:pic>
+        <p:nvPicPr>
+          <p:cNvPr id="32" name="Picture 31" descr="A person wearing a mask&#10;&#10;Description automatically generated with low confidence">
+            <a:extLst>
+              <a:ext uri="{FF2B5EF4-FFF2-40B4-BE49-F238E27FC236}">
+                <a16:creationId xmlns:a16="http://schemas.microsoft.com/office/drawing/2014/main" id="{73006CCC-A8D5-0B46-9273-2B217D1AD185}"/>
+              </a:ext>
+            </a:extLst>
+          </p:cNvPr>
+          <p:cNvPicPr>
+            <a:picLocks noChangeAspect="1"/>
+          </p:cNvPicPr>
+          <p:nvPr/>
+        </p:nvPicPr>
+        <p:blipFill>
+          <a:blip r:embed="rId4"/>
+          <a:stretch>
+            <a:fillRect/>
+          </a:stretch>
+        </p:blipFill>
+        <p:spPr>
+          <a:xfrm>
+            <a:off x="4920223" y="2869928"/>
+            <a:ext cx="1178386" cy="970599"/>
+          </a:xfrm>
+          <a:prstGeom prst="rect">
+            <a:avLst/>
+          </a:prstGeom>
+        </p:spPr>
+      </p:pic>
+      <p:pic>
+        <p:nvPicPr>
+          <p:cNvPr id="33" name="Picture 32" descr="A person wearing a mask&#10;&#10;Description automatically generated with low confidence">
+            <a:extLst>
+              <a:ext uri="{FF2B5EF4-FFF2-40B4-BE49-F238E27FC236}">
+                <a16:creationId xmlns:a16="http://schemas.microsoft.com/office/drawing/2014/main" id="{07152E19-1D5B-BE42-BC98-439740B46635}"/>
+              </a:ext>
+            </a:extLst>
+          </p:cNvPr>
+          <p:cNvPicPr>
+            <a:picLocks noChangeAspect="1"/>
+          </p:cNvPicPr>
+          <p:nvPr/>
+        </p:nvPicPr>
+        <p:blipFill>
+          <a:blip r:embed="rId4"/>
+          <a:stretch>
+            <a:fillRect/>
+          </a:stretch>
+        </p:blipFill>
+        <p:spPr>
+          <a:xfrm>
+            <a:off x="6166479" y="2869928"/>
+            <a:ext cx="1178386" cy="970599"/>
+          </a:xfrm>
+          <a:prstGeom prst="rect">
+            <a:avLst/>
+          </a:prstGeom>
+        </p:spPr>
+      </p:pic>
+      <p:pic>
+        <p:nvPicPr>
+          <p:cNvPr id="34" name="Picture 33" descr="A person wearing a mask&#10;&#10;Description automatically generated with low confidence">
+            <a:extLst>
+              <a:ext uri="{FF2B5EF4-FFF2-40B4-BE49-F238E27FC236}">
+                <a16:creationId xmlns:a16="http://schemas.microsoft.com/office/drawing/2014/main" id="{B67E5662-A704-5A49-8569-1F8A66431352}"/>
+              </a:ext>
+            </a:extLst>
+          </p:cNvPr>
+          <p:cNvPicPr>
+            <a:picLocks noChangeAspect="1"/>
+          </p:cNvPicPr>
+          <p:nvPr/>
+        </p:nvPicPr>
+        <p:blipFill>
+          <a:blip r:embed="rId4"/>
+          <a:stretch>
+            <a:fillRect/>
+          </a:stretch>
+        </p:blipFill>
+        <p:spPr>
+          <a:xfrm>
+            <a:off x="7398056" y="2869928"/>
+            <a:ext cx="1178386" cy="970599"/>
+          </a:xfrm>
+          <a:prstGeom prst="rect">
+            <a:avLst/>
+          </a:prstGeom>
+        </p:spPr>
+      </p:pic>
+      <p:pic>
+        <p:nvPicPr>
+          <p:cNvPr id="35" name="Picture 34" descr="A person wearing a mask&#10;&#10;Description automatically generated with low confidence">
+            <a:extLst>
+              <a:ext uri="{FF2B5EF4-FFF2-40B4-BE49-F238E27FC236}">
+                <a16:creationId xmlns:a16="http://schemas.microsoft.com/office/drawing/2014/main" id="{D475CAA5-702D-D147-BDB1-8C8D2DA6BDD6}"/>
+              </a:ext>
+            </a:extLst>
+          </p:cNvPr>
+          <p:cNvPicPr>
+            <a:picLocks noChangeAspect="1"/>
+          </p:cNvPicPr>
+          <p:nvPr/>
+        </p:nvPicPr>
+        <p:blipFill>
+          <a:blip r:embed="rId4"/>
+          <a:stretch>
+            <a:fillRect/>
+          </a:stretch>
+        </p:blipFill>
+        <p:spPr>
+          <a:xfrm>
+            <a:off x="8629633" y="2869928"/>
+            <a:ext cx="1178386" cy="970599"/>
+          </a:xfrm>
+          <a:prstGeom prst="rect">
+            <a:avLst/>
+          </a:prstGeom>
+        </p:spPr>
+      </p:pic>
+      <p:pic>
+        <p:nvPicPr>
+          <p:cNvPr id="36" name="Picture 35" descr="A person wearing a mask&#10;&#10;Description automatically generated with low confidence">
+            <a:extLst>
+              <a:ext uri="{FF2B5EF4-FFF2-40B4-BE49-F238E27FC236}">
+                <a16:creationId xmlns:a16="http://schemas.microsoft.com/office/drawing/2014/main" id="{21B91B89-B18D-814B-90AF-7D2FEA8B0F92}"/>
+              </a:ext>
+            </a:extLst>
+          </p:cNvPr>
+          <p:cNvPicPr>
+            <a:picLocks noChangeAspect="1"/>
+          </p:cNvPicPr>
+          <p:nvPr/>
+        </p:nvPicPr>
+        <p:blipFill>
+          <a:blip r:embed="rId4"/>
+          <a:stretch>
+            <a:fillRect/>
+          </a:stretch>
+        </p:blipFill>
+        <p:spPr>
+          <a:xfrm>
+            <a:off x="9875888" y="2869928"/>
+            <a:ext cx="1178386" cy="970599"/>
           </a:xfrm>
           <a:prstGeom prst="rect">
             <a:avLst/>

</xml_diff>